<commit_message>
module system pptx ueberarbeiten
</commit_message>
<xml_diff>
--- a/presentation/module-system.pptx
+++ b/presentation/module-system.pptx
@@ -5,12 +5,13 @@
     <p:sldMasterId id="2147483660" r:id="rId4"/>
   </p:sldMasterIdLst>
   <p:notesMasterIdLst>
-    <p:notesMasterId r:id="rId8"/>
+    <p:notesMasterId r:id="rId9"/>
   </p:notesMasterIdLst>
   <p:sldIdLst>
     <p:sldId id="256" r:id="rId5"/>
     <p:sldId id="259" r:id="rId6"/>
     <p:sldId id="260" r:id="rId7"/>
+    <p:sldId id="261" r:id="rId8"/>
   </p:sldIdLst>
   <p:sldSz cx="12192000" cy="6858000"/>
   <p:notesSz cx="6858000" cy="9144000"/>
@@ -121,6 +122,7 @@
 <p1510:revInfo xmlns:a="http://schemas.openxmlformats.org/drawingml/2006/main" xmlns:r="http://schemas.openxmlformats.org/officeDocument/2006/relationships" xmlns:p1510="http://schemas.microsoft.com/office/powerpoint/2015/10/main">
   <p1510:revLst>
     <p1510:client id="{10CA512F-2333-492C-9C0C-1F170DD39E8E}" v="520" dt="2024-04-09T19:35:39.537"/>
+    <p1510:client id="{41B29703-7A82-44AD-BF8B-BE35630EC1CA}" v="12" dt="2024-04-10T09:08:41.823"/>
     <p1510:client id="{8372713F-5768-450E-8593-4425707B2E0D}" v="591" dt="2024-04-08T16:36:56.929"/>
   </p1510:revLst>
 </p1510:revInfo>
@@ -128,6 +130,54 @@
 
 <file path=ppt/changesInfos/changesInfo1.xml><?xml version="1.0" encoding="utf-8"?>
 <pc:chgInfo xmlns:a="http://schemas.openxmlformats.org/drawingml/2006/main" xmlns:r="http://schemas.openxmlformats.org/officeDocument/2006/relationships" xmlns:ac="http://schemas.microsoft.com/office/drawing/2013/main/command" xmlns:pc="http://schemas.microsoft.com/office/powerpoint/2013/main/command">
+  <pc:docChgLst>
+    <pc:chgData name="Manfred Beutel" userId="S::manfred.beutel@andrena.de::b0e2bbe8-4830-4aef-9228-99d2b203e313" providerId="AD" clId="Web-{41B29703-7A82-44AD-BF8B-BE35630EC1CA}"/>
+    <pc:docChg chg="addSld modSld">
+      <pc:chgData name="Manfred Beutel" userId="S::manfred.beutel@andrena.de::b0e2bbe8-4830-4aef-9228-99d2b203e313" providerId="AD" clId="Web-{41B29703-7A82-44AD-BF8B-BE35630EC1CA}" dt="2024-04-10T09:09:02.776" v="10"/>
+      <pc:docMkLst>
+        <pc:docMk/>
+      </pc:docMkLst>
+      <pc:sldChg chg="addSp delSp modSp add replId modNotes">
+        <pc:chgData name="Manfred Beutel" userId="S::manfred.beutel@andrena.de::b0e2bbe8-4830-4aef-9228-99d2b203e313" providerId="AD" clId="Web-{41B29703-7A82-44AD-BF8B-BE35630EC1CA}" dt="2024-04-10T09:09:02.776" v="10"/>
+        <pc:sldMkLst>
+          <pc:docMk/>
+          <pc:sldMk cId="4060297602" sldId="261"/>
+        </pc:sldMkLst>
+        <pc:spChg chg="del">
+          <ac:chgData name="Manfred Beutel" userId="S::manfred.beutel@andrena.de::b0e2bbe8-4830-4aef-9228-99d2b203e313" providerId="AD" clId="Web-{41B29703-7A82-44AD-BF8B-BE35630EC1CA}" dt="2024-04-10T09:06:59.448" v="1"/>
+          <ac:spMkLst>
+            <pc:docMk/>
+            <pc:sldMk cId="4060297602" sldId="261"/>
+            <ac:spMk id="3" creationId="{DC772FEC-1DC0-B2F2-3A9E-F4EEF4D46270}"/>
+          </ac:spMkLst>
+        </pc:spChg>
+        <pc:spChg chg="add del mod">
+          <ac:chgData name="Manfred Beutel" userId="S::manfred.beutel@andrena.de::b0e2bbe8-4830-4aef-9228-99d2b203e313" providerId="AD" clId="Web-{41B29703-7A82-44AD-BF8B-BE35630EC1CA}" dt="2024-04-10T09:07:16.182" v="2"/>
+          <ac:spMkLst>
+            <pc:docMk/>
+            <pc:sldMk cId="4060297602" sldId="261"/>
+            <ac:spMk id="5" creationId="{F7263BA9-CD53-7908-9E06-B0D4D695C751}"/>
+          </ac:spMkLst>
+        </pc:spChg>
+        <pc:picChg chg="add del mod">
+          <ac:chgData name="Manfred Beutel" userId="S::manfred.beutel@andrena.de::b0e2bbe8-4830-4aef-9228-99d2b203e313" providerId="AD" clId="Web-{41B29703-7A82-44AD-BF8B-BE35630EC1CA}" dt="2024-04-10T09:08:36.479" v="7"/>
+          <ac:picMkLst>
+            <pc:docMk/>
+            <pc:sldMk cId="4060297602" sldId="261"/>
+            <ac:picMk id="6" creationId="{F43B45E3-D052-89AD-A1C6-FC1432A6BB41}"/>
+          </ac:picMkLst>
+        </pc:picChg>
+        <pc:picChg chg="add mod">
+          <ac:chgData name="Manfred Beutel" userId="S::manfred.beutel@andrena.de::b0e2bbe8-4830-4aef-9228-99d2b203e313" providerId="AD" clId="Web-{41B29703-7A82-44AD-BF8B-BE35630EC1CA}" dt="2024-04-10T09:08:41.823" v="9" actId="1076"/>
+          <ac:picMkLst>
+            <pc:docMk/>
+            <pc:sldMk cId="4060297602" sldId="261"/>
+            <ac:picMk id="7" creationId="{6B69919E-C8A6-9FC8-FDE7-584CA05DBDF3}"/>
+          </ac:picMkLst>
+        </pc:picChg>
+      </pc:sldChg>
+    </pc:docChg>
+  </pc:docChgLst>
   <pc:docChgLst>
     <pc:chgData name="Manfred Beutel" userId="S::manfred.beutel@andrena.de::b0e2bbe8-4830-4aef-9228-99d2b203e313" providerId="AD" clId="Web-{8372713F-5768-450E-8593-4425707B2E0D}"/>
     <pc:docChg chg="addSld delSld modSld">
@@ -613,7 +663,7 @@
           </a:lstStyle>
           <a:p>
             <a:fld id="{54E3AD36-28F3-4FDB-8DB9-0E56D48BEEB0}" type="datetimeFigureOut">
-              <a:t>4/9/2024</a:t>
+              <a:t>4/10/2024</a:t>
             </a:fld>
             <a:endParaRPr lang="en-US"/>
           </a:p>
@@ -1078,7 +1128,7 @@
           <a:lstStyle/>
           <a:p>
             <a:fld id="{BD2C0F44-F5BD-4D36-AE84-9F5137FE41E5}" type="slidenum">
-              <a:t>3</a:t>
+              <a:t>2</a:t>
             </a:fld>
             <a:endParaRPr lang="en-US"/>
           </a:p>
@@ -1167,7 +1217,7 @@
           <a:lstStyle/>
           <a:p>
             <a:fld id="{BD2C0F44-F5BD-4D36-AE84-9F5137FE41E5}" type="slidenum">
-              <a:t>4</a:t>
+              <a:t>3</a:t>
             </a:fld>
             <a:endParaRPr lang="en-US"/>
           </a:p>
@@ -1177,6 +1227,89 @@
     <p:extLst>
       <p:ext uri="{BB962C8B-B14F-4D97-AF65-F5344CB8AC3E}">
         <p14:creationId xmlns:p14="http://schemas.microsoft.com/office/powerpoint/2010/main" val="3552831138"/>
+      </p:ext>
+    </p:extLst>
+  </p:cSld>
+  <p:clrMapOvr>
+    <a:masterClrMapping/>
+  </p:clrMapOvr>
+</p:notes>
+</file>
+
+<file path=ppt/notesSlides/notesSlide3.xml><?xml version="1.0" encoding="utf-8"?>
+<p:notes xmlns:a="http://schemas.openxmlformats.org/drawingml/2006/main" xmlns:r="http://schemas.openxmlformats.org/officeDocument/2006/relationships" xmlns:p="http://schemas.openxmlformats.org/presentationml/2006/main">
+  <p:cSld>
+    <p:spTree>
+      <p:nvGrpSpPr>
+        <p:cNvPr id="1" name=""/>
+        <p:cNvGrpSpPr/>
+        <p:nvPr/>
+      </p:nvGrpSpPr>
+      <p:grpSpPr>
+        <a:xfrm>
+          <a:off x="0" y="0"/>
+          <a:ext cx="0" cy="0"/>
+          <a:chOff x="0" y="0"/>
+          <a:chExt cx="0" cy="0"/>
+        </a:xfrm>
+      </p:grpSpPr>
+      <p:sp>
+        <p:nvSpPr>
+          <p:cNvPr id="2" name="Slide Image Placeholder 1"/>
+          <p:cNvSpPr>
+            <a:spLocks noGrp="1" noRot="1" noChangeAspect="1"/>
+          </p:cNvSpPr>
+          <p:nvPr>
+            <p:ph type="sldImg"/>
+          </p:nvPr>
+        </p:nvSpPr>
+        <p:spPr/>
+      </p:sp>
+      <p:sp>
+        <p:nvSpPr>
+          <p:cNvPr id="3" name="Notes Placeholder 2"/>
+          <p:cNvSpPr>
+            <a:spLocks noGrp="1"/>
+          </p:cNvSpPr>
+          <p:nvPr>
+            <p:ph type="body" idx="1"/>
+          </p:nvPr>
+        </p:nvSpPr>
+        <p:spPr/>
+        <p:txBody>
+          <a:bodyPr/>
+          <a:lstStyle/>
+          <a:p>
+            <a:endParaRPr lang="en-US" dirty="0"/>
+          </a:p>
+        </p:txBody>
+      </p:sp>
+      <p:sp>
+        <p:nvSpPr>
+          <p:cNvPr id="4" name="Slide Number Placeholder 3"/>
+          <p:cNvSpPr>
+            <a:spLocks noGrp="1"/>
+          </p:cNvSpPr>
+          <p:nvPr>
+            <p:ph type="sldNum" sz="quarter" idx="5"/>
+          </p:nvPr>
+        </p:nvSpPr>
+        <p:spPr/>
+        <p:txBody>
+          <a:bodyPr/>
+          <a:lstStyle/>
+          <a:p>
+            <a:fld id="{BD2C0F44-F5BD-4D36-AE84-9F5137FE41E5}" type="slidenum">
+              <a:t>4</a:t>
+            </a:fld>
+            <a:endParaRPr lang="en-US"/>
+          </a:p>
+        </p:txBody>
+      </p:sp>
+    </p:spTree>
+    <p:extLst>
+      <p:ext uri="{BB962C8B-B14F-4D97-AF65-F5344CB8AC3E}">
+        <p14:creationId xmlns:p14="http://schemas.microsoft.com/office/powerpoint/2010/main" val="3312074041"/>
       </p:ext>
     </p:extLst>
   </p:cSld>
@@ -1317,7 +1450,7 @@
           <a:p>
             <a:fld id="{846CE7D5-CF57-46EF-B807-FDD0502418D4}" type="datetimeFigureOut">
               <a:rPr lang="en-US" smtClean="0"/>
-              <a:t>4/9/2024</a:t>
+              <a:t>4/10/2024</a:t>
             </a:fld>
             <a:endParaRPr lang="en-US"/>
           </a:p>
@@ -1487,7 +1620,7 @@
           <a:p>
             <a:fld id="{846CE7D5-CF57-46EF-B807-FDD0502418D4}" type="datetimeFigureOut">
               <a:rPr lang="en-US" smtClean="0"/>
-              <a:t>4/9/2024</a:t>
+              <a:t>4/10/2024</a:t>
             </a:fld>
             <a:endParaRPr lang="en-US"/>
           </a:p>
@@ -1667,7 +1800,7 @@
           <a:p>
             <a:fld id="{846CE7D5-CF57-46EF-B807-FDD0502418D4}" type="datetimeFigureOut">
               <a:rPr lang="en-US" smtClean="0"/>
-              <a:t>4/9/2024</a:t>
+              <a:t>4/10/2024</a:t>
             </a:fld>
             <a:endParaRPr lang="en-US"/>
           </a:p>
@@ -1837,7 +1970,7 @@
           <a:p>
             <a:fld id="{846CE7D5-CF57-46EF-B807-FDD0502418D4}" type="datetimeFigureOut">
               <a:rPr lang="en-US" smtClean="0"/>
-              <a:t>4/9/2024</a:t>
+              <a:t>4/10/2024</a:t>
             </a:fld>
             <a:endParaRPr lang="en-US"/>
           </a:p>
@@ -2083,7 +2216,7 @@
           <a:p>
             <a:fld id="{846CE7D5-CF57-46EF-B807-FDD0502418D4}" type="datetimeFigureOut">
               <a:rPr lang="en-US" smtClean="0"/>
-              <a:t>4/9/2024</a:t>
+              <a:t>4/10/2024</a:t>
             </a:fld>
             <a:endParaRPr lang="en-US"/>
           </a:p>
@@ -2315,7 +2448,7 @@
           <a:p>
             <a:fld id="{846CE7D5-CF57-46EF-B807-FDD0502418D4}" type="datetimeFigureOut">
               <a:rPr lang="en-US" smtClean="0"/>
-              <a:t>4/9/2024</a:t>
+              <a:t>4/10/2024</a:t>
             </a:fld>
             <a:endParaRPr lang="en-US"/>
           </a:p>
@@ -2682,7 +2815,7 @@
           <a:p>
             <a:fld id="{846CE7D5-CF57-46EF-B807-FDD0502418D4}" type="datetimeFigureOut">
               <a:rPr lang="en-US" smtClean="0"/>
-              <a:t>4/9/2024</a:t>
+              <a:t>4/10/2024</a:t>
             </a:fld>
             <a:endParaRPr lang="en-US"/>
           </a:p>
@@ -2800,7 +2933,7 @@
           <a:p>
             <a:fld id="{846CE7D5-CF57-46EF-B807-FDD0502418D4}" type="datetimeFigureOut">
               <a:rPr lang="en-US" smtClean="0"/>
-              <a:t>4/9/2024</a:t>
+              <a:t>4/10/2024</a:t>
             </a:fld>
             <a:endParaRPr lang="en-US"/>
           </a:p>
@@ -2895,7 +3028,7 @@
           <a:p>
             <a:fld id="{846CE7D5-CF57-46EF-B807-FDD0502418D4}" type="datetimeFigureOut">
               <a:rPr lang="en-US" smtClean="0"/>
-              <a:t>4/9/2024</a:t>
+              <a:t>4/10/2024</a:t>
             </a:fld>
             <a:endParaRPr lang="en-US"/>
           </a:p>
@@ -3172,7 +3305,7 @@
           <a:p>
             <a:fld id="{846CE7D5-CF57-46EF-B807-FDD0502418D4}" type="datetimeFigureOut">
               <a:rPr lang="en-US" smtClean="0"/>
-              <a:t>4/9/2024</a:t>
+              <a:t>4/10/2024</a:t>
             </a:fld>
             <a:endParaRPr lang="en-US"/>
           </a:p>
@@ -3429,7 +3562,7 @@
           <a:p>
             <a:fld id="{846CE7D5-CF57-46EF-B807-FDD0502418D4}" type="datetimeFigureOut">
               <a:rPr lang="en-US" smtClean="0"/>
-              <a:t>4/9/2024</a:t>
+              <a:t>4/10/2024</a:t>
             </a:fld>
             <a:endParaRPr lang="en-US"/>
           </a:p>
@@ -3642,7 +3775,7 @@
           <a:p>
             <a:fld id="{846CE7D5-CF57-46EF-B807-FDD0502418D4}" type="datetimeFigureOut">
               <a:rPr lang="en-US" smtClean="0"/>
-              <a:t>4/9/2024</a:t>
+              <a:t>4/10/2024</a:t>
             </a:fld>
             <a:endParaRPr lang="en-US"/>
           </a:p>
@@ -6489,6 +6622,810 @@
     <p:extLst>
       <p:ext uri="{BB962C8B-B14F-4D97-AF65-F5344CB8AC3E}">
         <p14:creationId xmlns:p14="http://schemas.microsoft.com/office/powerpoint/2010/main" val="51309743"/>
+      </p:ext>
+    </p:extLst>
+  </p:cSld>
+  <p:clrMapOvr>
+    <a:masterClrMapping/>
+  </p:clrMapOvr>
+</p:sld>
+</file>
+
+<file path=ppt/slides/slide4.xml><?xml version="1.0" encoding="utf-8"?>
+<p:sld xmlns:a="http://schemas.openxmlformats.org/drawingml/2006/main" xmlns:r="http://schemas.openxmlformats.org/officeDocument/2006/relationships" xmlns:p="http://schemas.openxmlformats.org/presentationml/2006/main">
+  <p:cSld>
+    <p:bg>
+      <p:bgPr>
+        <a:solidFill>
+          <a:schemeClr val="bg1"/>
+        </a:solidFill>
+        <a:effectLst/>
+      </p:bgPr>
+    </p:bg>
+    <p:spTree>
+      <p:nvGrpSpPr>
+        <p:cNvPr id="1" name=""/>
+        <p:cNvGrpSpPr/>
+        <p:nvPr/>
+      </p:nvGrpSpPr>
+      <p:grpSpPr>
+        <a:xfrm>
+          <a:off x="0" y="0"/>
+          <a:ext cx="0" cy="0"/>
+          <a:chOff x="0" y="0"/>
+          <a:chExt cx="0" cy="0"/>
+        </a:xfrm>
+      </p:grpSpPr>
+      <p:sp useBgFill="1">
+        <p:nvSpPr>
+          <p:cNvPr id="57" name="Rectangle 56">
+            <a:extLst>
+              <a:ext uri="{FF2B5EF4-FFF2-40B4-BE49-F238E27FC236}">
+                <a16:creationId xmlns:a16="http://schemas.microsoft.com/office/drawing/2014/main" id="{100EDD19-6802-4EC3-95CE-CFFAB042CFD6}"/>
+              </a:ext>
+              <a:ext uri="{C183D7F6-B498-43B3-948B-1728B52AA6E4}">
+                <adec:decorative xmlns:adec="http://schemas.microsoft.com/office/drawing/2017/decorative" val="1"/>
+              </a:ext>
+            </a:extLst>
+          </p:cNvPr>
+          <p:cNvSpPr>
+            <a:spLocks noGrp="1" noRot="1" noChangeAspect="1" noMove="1" noResize="1" noEditPoints="1" noAdjustHandles="1" noChangeArrowheads="1" noChangeShapeType="1" noTextEdit="1"/>
+          </p:cNvSpPr>
+          <p:nvPr>
+            <p:extLst>
+              <p:ext uri="{386F3935-93C4-4BCD-93E2-E3B085C9AB24}">
+                <p16:designElem xmlns:p16="http://schemas.microsoft.com/office/powerpoint/2015/main" val="1"/>
+              </p:ext>
+            </p:extLst>
+          </p:nvPr>
+        </p:nvSpPr>
+        <p:spPr>
+          <a:xfrm>
+            <a:off x="0" y="0"/>
+            <a:ext cx="12188952" cy="6858000"/>
+          </a:xfrm>
+          <a:prstGeom prst="rect">
+            <a:avLst/>
+          </a:prstGeom>
+          <a:ln>
+            <a:noFill/>
+          </a:ln>
+        </p:spPr>
+        <p:style>
+          <a:lnRef idx="2">
+            <a:schemeClr val="accent1">
+              <a:shade val="50000"/>
+            </a:schemeClr>
+          </a:lnRef>
+          <a:fillRef idx="1">
+            <a:schemeClr val="accent1"/>
+          </a:fillRef>
+          <a:effectRef idx="0">
+            <a:schemeClr val="accent1"/>
+          </a:effectRef>
+          <a:fontRef idx="minor">
+            <a:schemeClr val="lt1"/>
+          </a:fontRef>
+        </p:style>
+        <p:txBody>
+          <a:bodyPr rtlCol="0" anchor="ctr"/>
+          <a:lstStyle/>
+          <a:p>
+            <a:pPr algn="ctr"/>
+            <a:endParaRPr lang="en-US"/>
+          </a:p>
+        </p:txBody>
+      </p:sp>
+      <p:sp>
+        <p:nvSpPr>
+          <p:cNvPr id="2" name="Title 1">
+            <a:extLst>
+              <a:ext uri="{FF2B5EF4-FFF2-40B4-BE49-F238E27FC236}">
+                <a16:creationId xmlns:a16="http://schemas.microsoft.com/office/drawing/2014/main" id="{6CCA1832-BCF2-E263-A95F-8B54B4DB93E5}"/>
+              </a:ext>
+            </a:extLst>
+          </p:cNvPr>
+          <p:cNvSpPr>
+            <a:spLocks noGrp="1"/>
+          </p:cNvSpPr>
+          <p:nvPr>
+            <p:ph type="title"/>
+          </p:nvPr>
+        </p:nvSpPr>
+        <p:spPr>
+          <a:xfrm>
+            <a:off x="838200" y="365125"/>
+            <a:ext cx="10515600" cy="1325563"/>
+          </a:xfrm>
+        </p:spPr>
+        <p:txBody>
+          <a:bodyPr>
+            <a:normAutofit/>
+          </a:bodyPr>
+          <a:lstStyle/>
+          <a:p>
+            <a:r>
+              <a:rPr lang="en-US" sz="5400" dirty="0">
+                <a:latin typeface="Calibri"/>
+                <a:cs typeface="Calibri"/>
+              </a:rPr>
+              <a:t>How to organize Code</a:t>
+            </a:r>
+          </a:p>
+        </p:txBody>
+      </p:sp>
+      <p:sp>
+        <p:nvSpPr>
+          <p:cNvPr id="58" name="sketch line">
+            <a:extLst>
+              <a:ext uri="{FF2B5EF4-FFF2-40B4-BE49-F238E27FC236}">
+                <a16:creationId xmlns:a16="http://schemas.microsoft.com/office/drawing/2014/main" id="{DB17E863-922E-4C26-BD64-E8FD41D28661}"/>
+              </a:ext>
+              <a:ext uri="{C183D7F6-B498-43B3-948B-1728B52AA6E4}">
+                <adec:decorative xmlns:adec="http://schemas.microsoft.com/office/drawing/2017/decorative" val="1"/>
+              </a:ext>
+            </a:extLst>
+          </p:cNvPr>
+          <p:cNvSpPr>
+            <a:spLocks noGrp="1" noRot="1" noChangeAspect="1" noMove="1" noResize="1" noEditPoints="1" noAdjustHandles="1" noChangeArrowheads="1" noChangeShapeType="1" noTextEdit="1"/>
+          </p:cNvSpPr>
+          <p:nvPr>
+            <p:extLst>
+              <p:ext uri="{386F3935-93C4-4BCD-93E2-E3B085C9AB24}">
+                <p16:designElem xmlns:p16="http://schemas.microsoft.com/office/powerpoint/2015/main" val="1"/>
+              </p:ext>
+            </p:extLst>
+          </p:nvPr>
+        </p:nvSpPr>
+        <p:spPr>
+          <a:xfrm>
+            <a:off x="669036" y="1677373"/>
+            <a:ext cx="10853928" cy="18288"/>
+          </a:xfrm>
+          <a:custGeom>
+            <a:avLst/>
+            <a:gdLst>
+              <a:gd name="connsiteX0" fmla="*/ 0 w 10853928"/>
+              <a:gd name="connsiteY0" fmla="*/ 0 h 18288"/>
+              <a:gd name="connsiteX1" fmla="*/ 461292 w 10853928"/>
+              <a:gd name="connsiteY1" fmla="*/ 0 h 18288"/>
+              <a:gd name="connsiteX2" fmla="*/ 1139662 w 10853928"/>
+              <a:gd name="connsiteY2" fmla="*/ 0 h 18288"/>
+              <a:gd name="connsiteX3" fmla="*/ 1926572 w 10853928"/>
+              <a:gd name="connsiteY3" fmla="*/ 0 h 18288"/>
+              <a:gd name="connsiteX4" fmla="*/ 2279325 w 10853928"/>
+              <a:gd name="connsiteY4" fmla="*/ 0 h 18288"/>
+              <a:gd name="connsiteX5" fmla="*/ 2632078 w 10853928"/>
+              <a:gd name="connsiteY5" fmla="*/ 0 h 18288"/>
+              <a:gd name="connsiteX6" fmla="*/ 3527527 w 10853928"/>
+              <a:gd name="connsiteY6" fmla="*/ 0 h 18288"/>
+              <a:gd name="connsiteX7" fmla="*/ 4205897 w 10853928"/>
+              <a:gd name="connsiteY7" fmla="*/ 0 h 18288"/>
+              <a:gd name="connsiteX8" fmla="*/ 4558650 w 10853928"/>
+              <a:gd name="connsiteY8" fmla="*/ 0 h 18288"/>
+              <a:gd name="connsiteX9" fmla="*/ 5237020 w 10853928"/>
+              <a:gd name="connsiteY9" fmla="*/ 0 h 18288"/>
+              <a:gd name="connsiteX10" fmla="*/ 6132469 w 10853928"/>
+              <a:gd name="connsiteY10" fmla="*/ 0 h 18288"/>
+              <a:gd name="connsiteX11" fmla="*/ 6702301 w 10853928"/>
+              <a:gd name="connsiteY11" fmla="*/ 0 h 18288"/>
+              <a:gd name="connsiteX12" fmla="*/ 7272132 w 10853928"/>
+              <a:gd name="connsiteY12" fmla="*/ 0 h 18288"/>
+              <a:gd name="connsiteX13" fmla="*/ 7950502 w 10853928"/>
+              <a:gd name="connsiteY13" fmla="*/ 0 h 18288"/>
+              <a:gd name="connsiteX14" fmla="*/ 8737412 w 10853928"/>
+              <a:gd name="connsiteY14" fmla="*/ 0 h 18288"/>
+              <a:gd name="connsiteX15" fmla="*/ 9524322 w 10853928"/>
+              <a:gd name="connsiteY15" fmla="*/ 0 h 18288"/>
+              <a:gd name="connsiteX16" fmla="*/ 10853928 w 10853928"/>
+              <a:gd name="connsiteY16" fmla="*/ 0 h 18288"/>
+              <a:gd name="connsiteX17" fmla="*/ 10853928 w 10853928"/>
+              <a:gd name="connsiteY17" fmla="*/ 18288 h 18288"/>
+              <a:gd name="connsiteX18" fmla="*/ 10392636 w 10853928"/>
+              <a:gd name="connsiteY18" fmla="*/ 18288 h 18288"/>
+              <a:gd name="connsiteX19" fmla="*/ 9497187 w 10853928"/>
+              <a:gd name="connsiteY19" fmla="*/ 18288 h 18288"/>
+              <a:gd name="connsiteX20" fmla="*/ 8818817 w 10853928"/>
+              <a:gd name="connsiteY20" fmla="*/ 18288 h 18288"/>
+              <a:gd name="connsiteX21" fmla="*/ 8466064 w 10853928"/>
+              <a:gd name="connsiteY21" fmla="*/ 18288 h 18288"/>
+              <a:gd name="connsiteX22" fmla="*/ 7787693 w 10853928"/>
+              <a:gd name="connsiteY22" fmla="*/ 18288 h 18288"/>
+              <a:gd name="connsiteX23" fmla="*/ 7217862 w 10853928"/>
+              <a:gd name="connsiteY23" fmla="*/ 18288 h 18288"/>
+              <a:gd name="connsiteX24" fmla="*/ 6648031 w 10853928"/>
+              <a:gd name="connsiteY24" fmla="*/ 18288 h 18288"/>
+              <a:gd name="connsiteX25" fmla="*/ 6078200 w 10853928"/>
+              <a:gd name="connsiteY25" fmla="*/ 18288 h 18288"/>
+              <a:gd name="connsiteX26" fmla="*/ 5508368 w 10853928"/>
+              <a:gd name="connsiteY26" fmla="*/ 18288 h 18288"/>
+              <a:gd name="connsiteX27" fmla="*/ 4721459 w 10853928"/>
+              <a:gd name="connsiteY27" fmla="*/ 18288 h 18288"/>
+              <a:gd name="connsiteX28" fmla="*/ 4043088 w 10853928"/>
+              <a:gd name="connsiteY28" fmla="*/ 18288 h 18288"/>
+              <a:gd name="connsiteX29" fmla="*/ 3690336 w 10853928"/>
+              <a:gd name="connsiteY29" fmla="*/ 18288 h 18288"/>
+              <a:gd name="connsiteX30" fmla="*/ 3120504 w 10853928"/>
+              <a:gd name="connsiteY30" fmla="*/ 18288 h 18288"/>
+              <a:gd name="connsiteX31" fmla="*/ 2333595 w 10853928"/>
+              <a:gd name="connsiteY31" fmla="*/ 18288 h 18288"/>
+              <a:gd name="connsiteX32" fmla="*/ 1872303 w 10853928"/>
+              <a:gd name="connsiteY32" fmla="*/ 18288 h 18288"/>
+              <a:gd name="connsiteX33" fmla="*/ 976854 w 10853928"/>
+              <a:gd name="connsiteY33" fmla="*/ 18288 h 18288"/>
+              <a:gd name="connsiteX34" fmla="*/ 0 w 10853928"/>
+              <a:gd name="connsiteY34" fmla="*/ 18288 h 18288"/>
+              <a:gd name="connsiteX35" fmla="*/ 0 w 10853928"/>
+              <a:gd name="connsiteY35" fmla="*/ 0 h 18288"/>
+            </a:gdLst>
+            <a:ahLst/>
+            <a:cxnLst>
+              <a:cxn ang="0">
+                <a:pos x="connsiteX0" y="connsiteY0"/>
+              </a:cxn>
+              <a:cxn ang="0">
+                <a:pos x="connsiteX1" y="connsiteY1"/>
+              </a:cxn>
+              <a:cxn ang="0">
+                <a:pos x="connsiteX2" y="connsiteY2"/>
+              </a:cxn>
+              <a:cxn ang="0">
+                <a:pos x="connsiteX3" y="connsiteY3"/>
+              </a:cxn>
+              <a:cxn ang="0">
+                <a:pos x="connsiteX4" y="connsiteY4"/>
+              </a:cxn>
+              <a:cxn ang="0">
+                <a:pos x="connsiteX5" y="connsiteY5"/>
+              </a:cxn>
+              <a:cxn ang="0">
+                <a:pos x="connsiteX6" y="connsiteY6"/>
+              </a:cxn>
+              <a:cxn ang="0">
+                <a:pos x="connsiteX7" y="connsiteY7"/>
+              </a:cxn>
+              <a:cxn ang="0">
+                <a:pos x="connsiteX8" y="connsiteY8"/>
+              </a:cxn>
+              <a:cxn ang="0">
+                <a:pos x="connsiteX9" y="connsiteY9"/>
+              </a:cxn>
+              <a:cxn ang="0">
+                <a:pos x="connsiteX10" y="connsiteY10"/>
+              </a:cxn>
+              <a:cxn ang="0">
+                <a:pos x="connsiteX11" y="connsiteY11"/>
+              </a:cxn>
+              <a:cxn ang="0">
+                <a:pos x="connsiteX12" y="connsiteY12"/>
+              </a:cxn>
+              <a:cxn ang="0">
+                <a:pos x="connsiteX13" y="connsiteY13"/>
+              </a:cxn>
+              <a:cxn ang="0">
+                <a:pos x="connsiteX14" y="connsiteY14"/>
+              </a:cxn>
+              <a:cxn ang="0">
+                <a:pos x="connsiteX15" y="connsiteY15"/>
+              </a:cxn>
+              <a:cxn ang="0">
+                <a:pos x="connsiteX16" y="connsiteY16"/>
+              </a:cxn>
+              <a:cxn ang="0">
+                <a:pos x="connsiteX17" y="connsiteY17"/>
+              </a:cxn>
+              <a:cxn ang="0">
+                <a:pos x="connsiteX18" y="connsiteY18"/>
+              </a:cxn>
+              <a:cxn ang="0">
+                <a:pos x="connsiteX19" y="connsiteY19"/>
+              </a:cxn>
+              <a:cxn ang="0">
+                <a:pos x="connsiteX20" y="connsiteY20"/>
+              </a:cxn>
+              <a:cxn ang="0">
+                <a:pos x="connsiteX21" y="connsiteY21"/>
+              </a:cxn>
+              <a:cxn ang="0">
+                <a:pos x="connsiteX22" y="connsiteY22"/>
+              </a:cxn>
+              <a:cxn ang="0">
+                <a:pos x="connsiteX23" y="connsiteY23"/>
+              </a:cxn>
+              <a:cxn ang="0">
+                <a:pos x="connsiteX24" y="connsiteY24"/>
+              </a:cxn>
+              <a:cxn ang="0">
+                <a:pos x="connsiteX25" y="connsiteY25"/>
+              </a:cxn>
+              <a:cxn ang="0">
+                <a:pos x="connsiteX26" y="connsiteY26"/>
+              </a:cxn>
+              <a:cxn ang="0">
+                <a:pos x="connsiteX27" y="connsiteY27"/>
+              </a:cxn>
+              <a:cxn ang="0">
+                <a:pos x="connsiteX28" y="connsiteY28"/>
+              </a:cxn>
+              <a:cxn ang="0">
+                <a:pos x="connsiteX29" y="connsiteY29"/>
+              </a:cxn>
+              <a:cxn ang="0">
+                <a:pos x="connsiteX30" y="connsiteY30"/>
+              </a:cxn>
+              <a:cxn ang="0">
+                <a:pos x="connsiteX31" y="connsiteY31"/>
+              </a:cxn>
+              <a:cxn ang="0">
+                <a:pos x="connsiteX32" y="connsiteY32"/>
+              </a:cxn>
+              <a:cxn ang="0">
+                <a:pos x="connsiteX33" y="connsiteY33"/>
+              </a:cxn>
+              <a:cxn ang="0">
+                <a:pos x="connsiteX34" y="connsiteY34"/>
+              </a:cxn>
+              <a:cxn ang="0">
+                <a:pos x="connsiteX35" y="connsiteY35"/>
+              </a:cxn>
+            </a:cxnLst>
+            <a:rect l="l" t="t" r="r" b="b"/>
+            <a:pathLst>
+              <a:path w="10853928" h="18288" fill="none" extrusionOk="0">
+                <a:moveTo>
+                  <a:pt x="0" y="0"/>
+                </a:moveTo>
+                <a:cubicBezTo>
+                  <a:pt x="146993" y="-19076"/>
+                  <a:pt x="347684" y="-4790"/>
+                  <a:pt x="461292" y="0"/>
+                </a:cubicBezTo>
+                <a:cubicBezTo>
+                  <a:pt x="574900" y="4790"/>
+                  <a:pt x="808367" y="19821"/>
+                  <a:pt x="1139662" y="0"/>
+                </a:cubicBezTo>
+                <a:cubicBezTo>
+                  <a:pt x="1470957" y="-19821"/>
+                  <a:pt x="1627405" y="5721"/>
+                  <a:pt x="1926572" y="0"/>
+                </a:cubicBezTo>
+                <a:cubicBezTo>
+                  <a:pt x="2225739" y="-5721"/>
+                  <a:pt x="2137730" y="-3235"/>
+                  <a:pt x="2279325" y="0"/>
+                </a:cubicBezTo>
+                <a:cubicBezTo>
+                  <a:pt x="2420920" y="3235"/>
+                  <a:pt x="2456518" y="9685"/>
+                  <a:pt x="2632078" y="0"/>
+                </a:cubicBezTo>
+                <a:cubicBezTo>
+                  <a:pt x="2807638" y="-9685"/>
+                  <a:pt x="3211516" y="-43007"/>
+                  <a:pt x="3527527" y="0"/>
+                </a:cubicBezTo>
+                <a:cubicBezTo>
+                  <a:pt x="3843538" y="43007"/>
+                  <a:pt x="4058833" y="22042"/>
+                  <a:pt x="4205897" y="0"/>
+                </a:cubicBezTo>
+                <a:cubicBezTo>
+                  <a:pt x="4352961" y="-22042"/>
+                  <a:pt x="4474805" y="-11846"/>
+                  <a:pt x="4558650" y="0"/>
+                </a:cubicBezTo>
+                <a:cubicBezTo>
+                  <a:pt x="4642495" y="11846"/>
+                  <a:pt x="5041928" y="-6069"/>
+                  <a:pt x="5237020" y="0"/>
+                </a:cubicBezTo>
+                <a:cubicBezTo>
+                  <a:pt x="5432112" y="6069"/>
+                  <a:pt x="5943266" y="-17479"/>
+                  <a:pt x="6132469" y="0"/>
+                </a:cubicBezTo>
+                <a:cubicBezTo>
+                  <a:pt x="6321672" y="17479"/>
+                  <a:pt x="6483872" y="26234"/>
+                  <a:pt x="6702301" y="0"/>
+                </a:cubicBezTo>
+                <a:cubicBezTo>
+                  <a:pt x="6920730" y="-26234"/>
+                  <a:pt x="6991194" y="-15156"/>
+                  <a:pt x="7272132" y="0"/>
+                </a:cubicBezTo>
+                <a:cubicBezTo>
+                  <a:pt x="7553070" y="15156"/>
+                  <a:pt x="7684444" y="-32961"/>
+                  <a:pt x="7950502" y="0"/>
+                </a:cubicBezTo>
+                <a:cubicBezTo>
+                  <a:pt x="8216560" y="32961"/>
+                  <a:pt x="8493290" y="-10491"/>
+                  <a:pt x="8737412" y="0"/>
+                </a:cubicBezTo>
+                <a:cubicBezTo>
+                  <a:pt x="8981534" y="10491"/>
+                  <a:pt x="9191586" y="-13899"/>
+                  <a:pt x="9524322" y="0"/>
+                </a:cubicBezTo>
+                <a:cubicBezTo>
+                  <a:pt x="9857058" y="13899"/>
+                  <a:pt x="10297509" y="7485"/>
+                  <a:pt x="10853928" y="0"/>
+                </a:cubicBezTo>
+                <a:cubicBezTo>
+                  <a:pt x="10854574" y="4451"/>
+                  <a:pt x="10854418" y="9226"/>
+                  <a:pt x="10853928" y="18288"/>
+                </a:cubicBezTo>
+                <a:cubicBezTo>
+                  <a:pt x="10691638" y="28522"/>
+                  <a:pt x="10574319" y="29578"/>
+                  <a:pt x="10392636" y="18288"/>
+                </a:cubicBezTo>
+                <a:cubicBezTo>
+                  <a:pt x="10210953" y="6998"/>
+                  <a:pt x="9836277" y="-16742"/>
+                  <a:pt x="9497187" y="18288"/>
+                </a:cubicBezTo>
+                <a:cubicBezTo>
+                  <a:pt x="9158097" y="53318"/>
+                  <a:pt x="9119479" y="30714"/>
+                  <a:pt x="8818817" y="18288"/>
+                </a:cubicBezTo>
+                <a:cubicBezTo>
+                  <a:pt x="8518155" y="5863"/>
+                  <a:pt x="8640037" y="6483"/>
+                  <a:pt x="8466064" y="18288"/>
+                </a:cubicBezTo>
+                <a:cubicBezTo>
+                  <a:pt x="8292091" y="30093"/>
+                  <a:pt x="7997656" y="18914"/>
+                  <a:pt x="7787693" y="18288"/>
+                </a:cubicBezTo>
+                <a:cubicBezTo>
+                  <a:pt x="7577730" y="17662"/>
+                  <a:pt x="7412468" y="21416"/>
+                  <a:pt x="7217862" y="18288"/>
+                </a:cubicBezTo>
+                <a:cubicBezTo>
+                  <a:pt x="7023256" y="15160"/>
+                  <a:pt x="6898018" y="14824"/>
+                  <a:pt x="6648031" y="18288"/>
+                </a:cubicBezTo>
+                <a:cubicBezTo>
+                  <a:pt x="6398044" y="21752"/>
+                  <a:pt x="6254402" y="38625"/>
+                  <a:pt x="6078200" y="18288"/>
+                </a:cubicBezTo>
+                <a:cubicBezTo>
+                  <a:pt x="5901998" y="-2049"/>
+                  <a:pt x="5622886" y="3213"/>
+                  <a:pt x="5508368" y="18288"/>
+                </a:cubicBezTo>
+                <a:cubicBezTo>
+                  <a:pt x="5393850" y="33363"/>
+                  <a:pt x="5036260" y="26830"/>
+                  <a:pt x="4721459" y="18288"/>
+                </a:cubicBezTo>
+                <a:cubicBezTo>
+                  <a:pt x="4406658" y="9746"/>
+                  <a:pt x="4239221" y="41551"/>
+                  <a:pt x="4043088" y="18288"/>
+                </a:cubicBezTo>
+                <a:cubicBezTo>
+                  <a:pt x="3846955" y="-4975"/>
+                  <a:pt x="3818802" y="34658"/>
+                  <a:pt x="3690336" y="18288"/>
+                </a:cubicBezTo>
+                <a:cubicBezTo>
+                  <a:pt x="3561870" y="1918"/>
+                  <a:pt x="3265491" y="42194"/>
+                  <a:pt x="3120504" y="18288"/>
+                </a:cubicBezTo>
+                <a:cubicBezTo>
+                  <a:pt x="2975517" y="-5618"/>
+                  <a:pt x="2720254" y="36673"/>
+                  <a:pt x="2333595" y="18288"/>
+                </a:cubicBezTo>
+                <a:cubicBezTo>
+                  <a:pt x="1946936" y="-97"/>
+                  <a:pt x="2097241" y="5776"/>
+                  <a:pt x="1872303" y="18288"/>
+                </a:cubicBezTo>
+                <a:cubicBezTo>
+                  <a:pt x="1647365" y="30800"/>
+                  <a:pt x="1282708" y="45380"/>
+                  <a:pt x="976854" y="18288"/>
+                </a:cubicBezTo>
+                <a:cubicBezTo>
+                  <a:pt x="671000" y="-8804"/>
+                  <a:pt x="408401" y="-12775"/>
+                  <a:pt x="0" y="18288"/>
+                </a:cubicBezTo>
+                <a:cubicBezTo>
+                  <a:pt x="-213" y="9468"/>
+                  <a:pt x="187" y="4459"/>
+                  <a:pt x="0" y="0"/>
+                </a:cubicBezTo>
+                <a:close/>
+              </a:path>
+              <a:path w="10853928" h="18288" stroke="0" extrusionOk="0">
+                <a:moveTo>
+                  <a:pt x="0" y="0"/>
+                </a:moveTo>
+                <a:cubicBezTo>
+                  <a:pt x="267322" y="15284"/>
+                  <a:pt x="415388" y="-21048"/>
+                  <a:pt x="569831" y="0"/>
+                </a:cubicBezTo>
+                <a:cubicBezTo>
+                  <a:pt x="724274" y="21048"/>
+                  <a:pt x="769333" y="-2353"/>
+                  <a:pt x="922584" y="0"/>
+                </a:cubicBezTo>
+                <a:cubicBezTo>
+                  <a:pt x="1075835" y="2353"/>
+                  <a:pt x="1399490" y="-145"/>
+                  <a:pt x="1818033" y="0"/>
+                </a:cubicBezTo>
+                <a:cubicBezTo>
+                  <a:pt x="2236576" y="145"/>
+                  <a:pt x="2145330" y="5482"/>
+                  <a:pt x="2387864" y="0"/>
+                </a:cubicBezTo>
+                <a:cubicBezTo>
+                  <a:pt x="2630398" y="-5482"/>
+                  <a:pt x="2793207" y="18487"/>
+                  <a:pt x="2957695" y="0"/>
+                </a:cubicBezTo>
+                <a:cubicBezTo>
+                  <a:pt x="3122183" y="-18487"/>
+                  <a:pt x="3579141" y="19003"/>
+                  <a:pt x="3853144" y="0"/>
+                </a:cubicBezTo>
+                <a:cubicBezTo>
+                  <a:pt x="4127147" y="-19003"/>
+                  <a:pt x="4209857" y="12211"/>
+                  <a:pt x="4314436" y="0"/>
+                </a:cubicBezTo>
+                <a:cubicBezTo>
+                  <a:pt x="4419015" y="-12211"/>
+                  <a:pt x="4762459" y="-17220"/>
+                  <a:pt x="5209885" y="0"/>
+                </a:cubicBezTo>
+                <a:cubicBezTo>
+                  <a:pt x="5657311" y="17220"/>
+                  <a:pt x="5692663" y="-3290"/>
+                  <a:pt x="6105335" y="0"/>
+                </a:cubicBezTo>
+                <a:cubicBezTo>
+                  <a:pt x="6518007" y="3290"/>
+                  <a:pt x="6455516" y="-5124"/>
+                  <a:pt x="6783705" y="0"/>
+                </a:cubicBezTo>
+                <a:cubicBezTo>
+                  <a:pt x="7111894" y="5124"/>
+                  <a:pt x="7441941" y="-17829"/>
+                  <a:pt x="7679154" y="0"/>
+                </a:cubicBezTo>
+                <a:cubicBezTo>
+                  <a:pt x="7916367" y="17829"/>
+                  <a:pt x="8102967" y="-24363"/>
+                  <a:pt x="8248985" y="0"/>
+                </a:cubicBezTo>
+                <a:cubicBezTo>
+                  <a:pt x="8395003" y="24363"/>
+                  <a:pt x="8552393" y="25505"/>
+                  <a:pt x="8818817" y="0"/>
+                </a:cubicBezTo>
+                <a:cubicBezTo>
+                  <a:pt x="9085241" y="-25505"/>
+                  <a:pt x="9411308" y="38000"/>
+                  <a:pt x="9605726" y="0"/>
+                </a:cubicBezTo>
+                <a:cubicBezTo>
+                  <a:pt x="9800144" y="-38000"/>
+                  <a:pt x="10006468" y="-25741"/>
+                  <a:pt x="10175558" y="0"/>
+                </a:cubicBezTo>
+                <a:cubicBezTo>
+                  <a:pt x="10344648" y="25741"/>
+                  <a:pt x="10696282" y="695"/>
+                  <a:pt x="10853928" y="0"/>
+                </a:cubicBezTo>
+                <a:cubicBezTo>
+                  <a:pt x="10853521" y="8690"/>
+                  <a:pt x="10853774" y="14141"/>
+                  <a:pt x="10853928" y="18288"/>
+                </a:cubicBezTo>
+                <a:cubicBezTo>
+                  <a:pt x="10608124" y="24255"/>
+                  <a:pt x="10343415" y="22307"/>
+                  <a:pt x="10067018" y="18288"/>
+                </a:cubicBezTo>
+                <a:cubicBezTo>
+                  <a:pt x="9790621" y="14270"/>
+                  <a:pt x="9843266" y="3564"/>
+                  <a:pt x="9714266" y="18288"/>
+                </a:cubicBezTo>
+                <a:cubicBezTo>
+                  <a:pt x="9585266" y="33012"/>
+                  <a:pt x="9379484" y="1875"/>
+                  <a:pt x="9252974" y="18288"/>
+                </a:cubicBezTo>
+                <a:cubicBezTo>
+                  <a:pt x="9126464" y="34701"/>
+                  <a:pt x="8580678" y="-4904"/>
+                  <a:pt x="8357525" y="18288"/>
+                </a:cubicBezTo>
+                <a:cubicBezTo>
+                  <a:pt x="8134372" y="41480"/>
+                  <a:pt x="7903199" y="26458"/>
+                  <a:pt x="7679154" y="18288"/>
+                </a:cubicBezTo>
+                <a:cubicBezTo>
+                  <a:pt x="7455109" y="10118"/>
+                  <a:pt x="7435944" y="27109"/>
+                  <a:pt x="7217862" y="18288"/>
+                </a:cubicBezTo>
+                <a:cubicBezTo>
+                  <a:pt x="6999780" y="9467"/>
+                  <a:pt x="6680409" y="18985"/>
+                  <a:pt x="6539492" y="18288"/>
+                </a:cubicBezTo>
+                <a:cubicBezTo>
+                  <a:pt x="6398575" y="17592"/>
+                  <a:pt x="6312077" y="33018"/>
+                  <a:pt x="6186739" y="18288"/>
+                </a:cubicBezTo>
+                <a:cubicBezTo>
+                  <a:pt x="6061401" y="3558"/>
+                  <a:pt x="5947033" y="12075"/>
+                  <a:pt x="5833986" y="18288"/>
+                </a:cubicBezTo>
+                <a:cubicBezTo>
+                  <a:pt x="5720939" y="24501"/>
+                  <a:pt x="5482226" y="8586"/>
+                  <a:pt x="5155616" y="18288"/>
+                </a:cubicBezTo>
+                <a:cubicBezTo>
+                  <a:pt x="4829006" y="27991"/>
+                  <a:pt x="4841274" y="29316"/>
+                  <a:pt x="4694324" y="18288"/>
+                </a:cubicBezTo>
+                <a:cubicBezTo>
+                  <a:pt x="4547374" y="7260"/>
+                  <a:pt x="4077675" y="7013"/>
+                  <a:pt x="3907414" y="18288"/>
+                </a:cubicBezTo>
+                <a:cubicBezTo>
+                  <a:pt x="3737153" y="29564"/>
+                  <a:pt x="3538393" y="21630"/>
+                  <a:pt x="3446122" y="18288"/>
+                </a:cubicBezTo>
+                <a:cubicBezTo>
+                  <a:pt x="3353851" y="14946"/>
+                  <a:pt x="2990320" y="-8091"/>
+                  <a:pt x="2659212" y="18288"/>
+                </a:cubicBezTo>
+                <a:cubicBezTo>
+                  <a:pt x="2328104" y="44667"/>
+                  <a:pt x="2427653" y="9607"/>
+                  <a:pt x="2306460" y="18288"/>
+                </a:cubicBezTo>
+                <a:cubicBezTo>
+                  <a:pt x="2185267" y="26969"/>
+                  <a:pt x="1719763" y="3717"/>
+                  <a:pt x="1519550" y="18288"/>
+                </a:cubicBezTo>
+                <a:cubicBezTo>
+                  <a:pt x="1319337" y="32860"/>
+                  <a:pt x="1167371" y="17040"/>
+                  <a:pt x="1058258" y="18288"/>
+                </a:cubicBezTo>
+                <a:cubicBezTo>
+                  <a:pt x="949145" y="19536"/>
+                  <a:pt x="780234" y="31447"/>
+                  <a:pt x="705505" y="18288"/>
+                </a:cubicBezTo>
+                <a:cubicBezTo>
+                  <a:pt x="630776" y="5129"/>
+                  <a:pt x="215796" y="30056"/>
+                  <a:pt x="0" y="18288"/>
+                </a:cubicBezTo>
+                <a:cubicBezTo>
+                  <a:pt x="-53" y="11301"/>
+                  <a:pt x="-649" y="7756"/>
+                  <a:pt x="0" y="0"/>
+                </a:cubicBezTo>
+                <a:close/>
+              </a:path>
+            </a:pathLst>
+          </a:custGeom>
+          <a:solidFill>
+            <a:schemeClr val="accent2"/>
+          </a:solidFill>
+          <a:ln w="41275" cap="rnd">
+            <a:solidFill>
+              <a:schemeClr val="accent2"/>
+            </a:solidFill>
+            <a:round/>
+            <a:extLst>
+              <a:ext uri="{C807C97D-BFC1-408E-A445-0C87EB9F89A2}">
+                <ask:lineSketchStyleProps xmlns:ask="http://schemas.microsoft.com/office/drawing/2018/sketchyshapes" sd="1219033472">
+                  <a:prstGeom prst="rect">
+                    <a:avLst/>
+                  </a:prstGeom>
+                  <ask:type>
+                    <ask:lineSketchFreehand/>
+                  </ask:type>
+                </ask:lineSketchStyleProps>
+              </a:ext>
+            </a:extLst>
+          </a:ln>
+        </p:spPr>
+        <p:style>
+          <a:lnRef idx="2">
+            <a:schemeClr val="accent1">
+              <a:shade val="50000"/>
+            </a:schemeClr>
+          </a:lnRef>
+          <a:fillRef idx="1">
+            <a:schemeClr val="accent1"/>
+          </a:fillRef>
+          <a:effectRef idx="0">
+            <a:schemeClr val="accent1"/>
+          </a:effectRef>
+          <a:fontRef idx="minor">
+            <a:schemeClr val="lt1"/>
+          </a:fontRef>
+        </p:style>
+        <p:txBody>
+          <a:bodyPr rtlCol="0" anchor="ctr"/>
+          <a:lstStyle/>
+          <a:p>
+            <a:pPr algn="ctr"/>
+            <a:endParaRPr lang="en-US"/>
+          </a:p>
+        </p:txBody>
+      </p:sp>
+      <p:pic>
+        <p:nvPicPr>
+          <p:cNvPr id="7" name="Picture 6" descr="A screenshot of a computer program&#10;&#10;Description automatically generated">
+            <a:extLst>
+              <a:ext uri="{FF2B5EF4-FFF2-40B4-BE49-F238E27FC236}">
+                <a16:creationId xmlns:a16="http://schemas.microsoft.com/office/drawing/2014/main" id="{6B69919E-C8A6-9FC8-FDE7-584CA05DBDF3}"/>
+              </a:ext>
+            </a:extLst>
+          </p:cNvPr>
+          <p:cNvPicPr>
+            <a:picLocks noChangeAspect="1"/>
+          </p:cNvPicPr>
+          <p:nvPr/>
+        </p:nvPicPr>
+        <p:blipFill>
+          <a:blip r:embed="rId3"/>
+          <a:stretch>
+            <a:fillRect/>
+          </a:stretch>
+        </p:blipFill>
+        <p:spPr>
+          <a:xfrm>
+            <a:off x="1857375" y="1846477"/>
+            <a:ext cx="8477250" cy="4714875"/>
+          </a:xfrm>
+          <a:prstGeom prst="rect">
+            <a:avLst/>
+          </a:prstGeom>
+        </p:spPr>
+      </p:pic>
+    </p:spTree>
+    <p:extLst>
+      <p:ext uri="{BB962C8B-B14F-4D97-AF65-F5344CB8AC3E}">
+        <p14:creationId xmlns:p14="http://schemas.microsoft.com/office/powerpoint/2010/main" val="4060297602"/>
       </p:ext>
     </p:extLst>
   </p:cSld>
@@ -7075,15 +8012,6 @@
 </file>
 
 <file path=customXml/item1.xml><?xml version="1.0" encoding="utf-8"?>
-<?mso-contentType ?>
-<FormTemplates xmlns="http://schemas.microsoft.com/sharepoint/v3/contenttype/forms">
-  <Display>DocumentLibraryForm</Display>
-  <Edit>DocumentLibraryForm</Edit>
-  <New>DocumentLibraryForm</New>
-</FormTemplates>
-</file>
-
-<file path=customXml/item2.xml><?xml version="1.0" encoding="utf-8"?>
 <ct:contentTypeSchema xmlns:ct="http://schemas.microsoft.com/office/2006/metadata/contentType" xmlns:ma="http://schemas.microsoft.com/office/2006/metadata/properties/metaAttributes" ct:_="" ma:_="" ma:contentTypeName="Dokument" ma:contentTypeID="0x010100D621BDA4189E154F90ED0E8C0FA3EBD9" ma:contentTypeVersion="17" ma:contentTypeDescription="Ein neues Dokument erstellen." ma:contentTypeScope="" ma:versionID="14af03d3aa5d72bd2ad0cb50dfd7c0dd">
   <xsd:schema xmlns:xsd="http://www.w3.org/2001/XMLSchema" xmlns:xs="http://www.w3.org/2001/XMLSchema" xmlns:p="http://schemas.microsoft.com/office/2006/metadata/properties" xmlns:ns2="22694a18-230a-4e5d-befa-207f3530a4d2" xmlns:ns3="31c289bb-896d-4442-b563-ee005c0273df" targetNamespace="http://schemas.microsoft.com/office/2006/metadata/properties" ma:root="true" ma:fieldsID="b20e732557c1aa7d6e2d5336cd30369d" ns2:_="" ns3:_="">
     <xsd:import namespace="22694a18-230a-4e5d-befa-207f3530a4d2"/>
@@ -7332,6 +8260,15 @@
 </ct:contentTypeSchema>
 </file>
 
+<file path=customXml/item2.xml><?xml version="1.0" encoding="utf-8"?>
+<?mso-contentType ?>
+<FormTemplates xmlns="http://schemas.microsoft.com/sharepoint/v3/contenttype/forms">
+  <Display>DocumentLibraryForm</Display>
+  <Edit>DocumentLibraryForm</Edit>
+  <New>DocumentLibraryForm</New>
+</FormTemplates>
+</file>
+
 <file path=customXml/item3.xml><?xml version="1.0" encoding="utf-8"?>
 <p:properties xmlns:p="http://schemas.microsoft.com/office/2006/metadata/properties" xmlns:xsi="http://www.w3.org/2001/XMLSchema-instance" xmlns:pc="http://schemas.microsoft.com/office/infopath/2007/PartnerControls">
   <documentManagement>
@@ -7344,14 +8281,6 @@
 </file>
 
 <file path=customXml/itemProps1.xml><?xml version="1.0" encoding="utf-8"?>
-<ds:datastoreItem xmlns:ds="http://schemas.openxmlformats.org/officeDocument/2006/customXml" ds:itemID="{34CEB47A-C3CE-432E-B85C-2596D7DA1C93}">
-  <ds:schemaRefs>
-    <ds:schemaRef ds:uri="http://schemas.microsoft.com/sharepoint/v3/contenttype/forms"/>
-  </ds:schemaRefs>
-</ds:datastoreItem>
-</file>
-
-<file path=customXml/itemProps2.xml><?xml version="1.0" encoding="utf-8"?>
 <ds:datastoreItem xmlns:ds="http://schemas.openxmlformats.org/officeDocument/2006/customXml" ds:itemID="{36C03A66-63E3-4DA8-9AF2-EC50F09C5ED1}">
   <ds:schemaRefs>
     <ds:schemaRef ds:uri="http://schemas.microsoft.com/office/2006/metadata/contentType"/>
@@ -7370,6 +8299,14 @@
 </ds:datastoreItem>
 </file>
 
+<file path=customXml/itemProps2.xml><?xml version="1.0" encoding="utf-8"?>
+<ds:datastoreItem xmlns:ds="http://schemas.openxmlformats.org/officeDocument/2006/customXml" ds:itemID="{34CEB47A-C3CE-432E-B85C-2596D7DA1C93}">
+  <ds:schemaRefs>
+    <ds:schemaRef ds:uri="http://schemas.microsoft.com/sharepoint/v3/contenttype/forms"/>
+  </ds:schemaRefs>
+</ds:datastoreItem>
+</file>
+
 <file path=customXml/itemProps3.xml><?xml version="1.0" encoding="utf-8"?>
 <ds:datastoreItem xmlns:ds="http://schemas.openxmlformats.org/officeDocument/2006/customXml" ds:itemID="{0DAF2711-3505-4570-97FA-D9F6458D46E3}">
   <ds:schemaRefs>

</xml_diff>

<commit_message>
module system neue praesentation
</commit_message>
<xml_diff>
--- a/presentation/module-system.pptx
+++ b/presentation/module-system.pptx
@@ -5,12 +5,13 @@
     <p:sldMasterId id="2147483660" r:id="rId4"/>
   </p:sldMasterIdLst>
   <p:notesMasterIdLst>
-    <p:notesMasterId r:id="rId8"/>
+    <p:notesMasterId r:id="rId9"/>
   </p:notesMasterIdLst>
   <p:sldIdLst>
     <p:sldId id="256" r:id="rId5"/>
     <p:sldId id="259" r:id="rId6"/>
     <p:sldId id="260" r:id="rId7"/>
+    <p:sldId id="261" r:id="rId8"/>
   </p:sldIdLst>
   <p:sldSz cx="12192000" cy="6858000"/>
   <p:notesSz cx="6858000" cy="9144000"/>
@@ -121,6 +122,7 @@
 <p1510:revInfo xmlns:a="http://schemas.openxmlformats.org/drawingml/2006/main" xmlns:r="http://schemas.openxmlformats.org/officeDocument/2006/relationships" xmlns:p1510="http://schemas.microsoft.com/office/powerpoint/2015/10/main">
   <p1510:revLst>
     <p1510:client id="{10CA512F-2333-492C-9C0C-1F170DD39E8E}" v="520" dt="2024-04-09T19:35:39.537"/>
+    <p1510:client id="{41B29703-7A82-44AD-BF8B-BE35630EC1CA}" v="12" dt="2024-04-10T09:08:41.823"/>
     <p1510:client id="{8372713F-5768-450E-8593-4425707B2E0D}" v="591" dt="2024-04-08T16:36:56.929"/>
   </p1510:revLst>
 </p1510:revInfo>
@@ -128,6 +130,54 @@
 
 <file path=ppt/changesInfos/changesInfo1.xml><?xml version="1.0" encoding="utf-8"?>
 <pc:chgInfo xmlns:a="http://schemas.openxmlformats.org/drawingml/2006/main" xmlns:r="http://schemas.openxmlformats.org/officeDocument/2006/relationships" xmlns:ac="http://schemas.microsoft.com/office/drawing/2013/main/command" xmlns:pc="http://schemas.microsoft.com/office/powerpoint/2013/main/command">
+  <pc:docChgLst>
+    <pc:chgData name="Manfred Beutel" userId="S::manfred.beutel@andrena.de::b0e2bbe8-4830-4aef-9228-99d2b203e313" providerId="AD" clId="Web-{41B29703-7A82-44AD-BF8B-BE35630EC1CA}"/>
+    <pc:docChg chg="addSld modSld">
+      <pc:chgData name="Manfred Beutel" userId="S::manfred.beutel@andrena.de::b0e2bbe8-4830-4aef-9228-99d2b203e313" providerId="AD" clId="Web-{41B29703-7A82-44AD-BF8B-BE35630EC1CA}" dt="2024-04-10T09:09:02.776" v="10"/>
+      <pc:docMkLst>
+        <pc:docMk/>
+      </pc:docMkLst>
+      <pc:sldChg chg="addSp delSp modSp add replId modNotes">
+        <pc:chgData name="Manfred Beutel" userId="S::manfred.beutel@andrena.de::b0e2bbe8-4830-4aef-9228-99d2b203e313" providerId="AD" clId="Web-{41B29703-7A82-44AD-BF8B-BE35630EC1CA}" dt="2024-04-10T09:09:02.776" v="10"/>
+        <pc:sldMkLst>
+          <pc:docMk/>
+          <pc:sldMk cId="4060297602" sldId="261"/>
+        </pc:sldMkLst>
+        <pc:spChg chg="del">
+          <ac:chgData name="Manfred Beutel" userId="S::manfred.beutel@andrena.de::b0e2bbe8-4830-4aef-9228-99d2b203e313" providerId="AD" clId="Web-{41B29703-7A82-44AD-BF8B-BE35630EC1CA}" dt="2024-04-10T09:06:59.448" v="1"/>
+          <ac:spMkLst>
+            <pc:docMk/>
+            <pc:sldMk cId="4060297602" sldId="261"/>
+            <ac:spMk id="3" creationId="{DC772FEC-1DC0-B2F2-3A9E-F4EEF4D46270}"/>
+          </ac:spMkLst>
+        </pc:spChg>
+        <pc:spChg chg="add del mod">
+          <ac:chgData name="Manfred Beutel" userId="S::manfred.beutel@andrena.de::b0e2bbe8-4830-4aef-9228-99d2b203e313" providerId="AD" clId="Web-{41B29703-7A82-44AD-BF8B-BE35630EC1CA}" dt="2024-04-10T09:07:16.182" v="2"/>
+          <ac:spMkLst>
+            <pc:docMk/>
+            <pc:sldMk cId="4060297602" sldId="261"/>
+            <ac:spMk id="5" creationId="{F7263BA9-CD53-7908-9E06-B0D4D695C751}"/>
+          </ac:spMkLst>
+        </pc:spChg>
+        <pc:picChg chg="add del mod">
+          <ac:chgData name="Manfred Beutel" userId="S::manfred.beutel@andrena.de::b0e2bbe8-4830-4aef-9228-99d2b203e313" providerId="AD" clId="Web-{41B29703-7A82-44AD-BF8B-BE35630EC1CA}" dt="2024-04-10T09:08:36.479" v="7"/>
+          <ac:picMkLst>
+            <pc:docMk/>
+            <pc:sldMk cId="4060297602" sldId="261"/>
+            <ac:picMk id="6" creationId="{F43B45E3-D052-89AD-A1C6-FC1432A6BB41}"/>
+          </ac:picMkLst>
+        </pc:picChg>
+        <pc:picChg chg="add mod">
+          <ac:chgData name="Manfred Beutel" userId="S::manfred.beutel@andrena.de::b0e2bbe8-4830-4aef-9228-99d2b203e313" providerId="AD" clId="Web-{41B29703-7A82-44AD-BF8B-BE35630EC1CA}" dt="2024-04-10T09:08:41.823" v="9" actId="1076"/>
+          <ac:picMkLst>
+            <pc:docMk/>
+            <pc:sldMk cId="4060297602" sldId="261"/>
+            <ac:picMk id="7" creationId="{6B69919E-C8A6-9FC8-FDE7-584CA05DBDF3}"/>
+          </ac:picMkLst>
+        </pc:picChg>
+      </pc:sldChg>
+    </pc:docChg>
+  </pc:docChgLst>
   <pc:docChgLst>
     <pc:chgData name="Manfred Beutel" userId="S::manfred.beutel@andrena.de::b0e2bbe8-4830-4aef-9228-99d2b203e313" providerId="AD" clId="Web-{8372713F-5768-450E-8593-4425707B2E0D}"/>
     <pc:docChg chg="addSld delSld modSld">
@@ -613,7 +663,7 @@
           </a:lstStyle>
           <a:p>
             <a:fld id="{54E3AD36-28F3-4FDB-8DB9-0E56D48BEEB0}" type="datetimeFigureOut">
-              <a:t>4/9/2024</a:t>
+              <a:t>4/10/2024</a:t>
             </a:fld>
             <a:endParaRPr lang="en-US"/>
           </a:p>
@@ -1078,7 +1128,7 @@
           <a:lstStyle/>
           <a:p>
             <a:fld id="{BD2C0F44-F5BD-4D36-AE84-9F5137FE41E5}" type="slidenum">
-              <a:t>3</a:t>
+              <a:t>2</a:t>
             </a:fld>
             <a:endParaRPr lang="en-US"/>
           </a:p>
@@ -1167,7 +1217,7 @@
           <a:lstStyle/>
           <a:p>
             <a:fld id="{BD2C0F44-F5BD-4D36-AE84-9F5137FE41E5}" type="slidenum">
-              <a:t>4</a:t>
+              <a:t>3</a:t>
             </a:fld>
             <a:endParaRPr lang="en-US"/>
           </a:p>
@@ -1177,6 +1227,89 @@
     <p:extLst>
       <p:ext uri="{BB962C8B-B14F-4D97-AF65-F5344CB8AC3E}">
         <p14:creationId xmlns:p14="http://schemas.microsoft.com/office/powerpoint/2010/main" val="3552831138"/>
+      </p:ext>
+    </p:extLst>
+  </p:cSld>
+  <p:clrMapOvr>
+    <a:masterClrMapping/>
+  </p:clrMapOvr>
+</p:notes>
+</file>
+
+<file path=ppt/notesSlides/notesSlide3.xml><?xml version="1.0" encoding="utf-8"?>
+<p:notes xmlns:a="http://schemas.openxmlformats.org/drawingml/2006/main" xmlns:r="http://schemas.openxmlformats.org/officeDocument/2006/relationships" xmlns:p="http://schemas.openxmlformats.org/presentationml/2006/main">
+  <p:cSld>
+    <p:spTree>
+      <p:nvGrpSpPr>
+        <p:cNvPr id="1" name=""/>
+        <p:cNvGrpSpPr/>
+        <p:nvPr/>
+      </p:nvGrpSpPr>
+      <p:grpSpPr>
+        <a:xfrm>
+          <a:off x="0" y="0"/>
+          <a:ext cx="0" cy="0"/>
+          <a:chOff x="0" y="0"/>
+          <a:chExt cx="0" cy="0"/>
+        </a:xfrm>
+      </p:grpSpPr>
+      <p:sp>
+        <p:nvSpPr>
+          <p:cNvPr id="2" name="Slide Image Placeholder 1"/>
+          <p:cNvSpPr>
+            <a:spLocks noGrp="1" noRot="1" noChangeAspect="1"/>
+          </p:cNvSpPr>
+          <p:nvPr>
+            <p:ph type="sldImg"/>
+          </p:nvPr>
+        </p:nvSpPr>
+        <p:spPr/>
+      </p:sp>
+      <p:sp>
+        <p:nvSpPr>
+          <p:cNvPr id="3" name="Notes Placeholder 2"/>
+          <p:cNvSpPr>
+            <a:spLocks noGrp="1"/>
+          </p:cNvSpPr>
+          <p:nvPr>
+            <p:ph type="body" idx="1"/>
+          </p:nvPr>
+        </p:nvSpPr>
+        <p:spPr/>
+        <p:txBody>
+          <a:bodyPr/>
+          <a:lstStyle/>
+          <a:p>
+            <a:endParaRPr lang="en-US" dirty="0"/>
+          </a:p>
+        </p:txBody>
+      </p:sp>
+      <p:sp>
+        <p:nvSpPr>
+          <p:cNvPr id="4" name="Slide Number Placeholder 3"/>
+          <p:cNvSpPr>
+            <a:spLocks noGrp="1"/>
+          </p:cNvSpPr>
+          <p:nvPr>
+            <p:ph type="sldNum" sz="quarter" idx="5"/>
+          </p:nvPr>
+        </p:nvSpPr>
+        <p:spPr/>
+        <p:txBody>
+          <a:bodyPr/>
+          <a:lstStyle/>
+          <a:p>
+            <a:fld id="{BD2C0F44-F5BD-4D36-AE84-9F5137FE41E5}" type="slidenum">
+              <a:t>4</a:t>
+            </a:fld>
+            <a:endParaRPr lang="en-US"/>
+          </a:p>
+        </p:txBody>
+      </p:sp>
+    </p:spTree>
+    <p:extLst>
+      <p:ext uri="{BB962C8B-B14F-4D97-AF65-F5344CB8AC3E}">
+        <p14:creationId xmlns:p14="http://schemas.microsoft.com/office/powerpoint/2010/main" val="3312074041"/>
       </p:ext>
     </p:extLst>
   </p:cSld>
@@ -1317,7 +1450,7 @@
           <a:p>
             <a:fld id="{846CE7D5-CF57-46EF-B807-FDD0502418D4}" type="datetimeFigureOut">
               <a:rPr lang="en-US" smtClean="0"/>
-              <a:t>4/9/2024</a:t>
+              <a:t>4/10/2024</a:t>
             </a:fld>
             <a:endParaRPr lang="en-US"/>
           </a:p>
@@ -1487,7 +1620,7 @@
           <a:p>
             <a:fld id="{846CE7D5-CF57-46EF-B807-FDD0502418D4}" type="datetimeFigureOut">
               <a:rPr lang="en-US" smtClean="0"/>
-              <a:t>4/9/2024</a:t>
+              <a:t>4/10/2024</a:t>
             </a:fld>
             <a:endParaRPr lang="en-US"/>
           </a:p>
@@ -1667,7 +1800,7 @@
           <a:p>
             <a:fld id="{846CE7D5-CF57-46EF-B807-FDD0502418D4}" type="datetimeFigureOut">
               <a:rPr lang="en-US" smtClean="0"/>
-              <a:t>4/9/2024</a:t>
+              <a:t>4/10/2024</a:t>
             </a:fld>
             <a:endParaRPr lang="en-US"/>
           </a:p>
@@ -1837,7 +1970,7 @@
           <a:p>
             <a:fld id="{846CE7D5-CF57-46EF-B807-FDD0502418D4}" type="datetimeFigureOut">
               <a:rPr lang="en-US" smtClean="0"/>
-              <a:t>4/9/2024</a:t>
+              <a:t>4/10/2024</a:t>
             </a:fld>
             <a:endParaRPr lang="en-US"/>
           </a:p>
@@ -2083,7 +2216,7 @@
           <a:p>
             <a:fld id="{846CE7D5-CF57-46EF-B807-FDD0502418D4}" type="datetimeFigureOut">
               <a:rPr lang="en-US" smtClean="0"/>
-              <a:t>4/9/2024</a:t>
+              <a:t>4/10/2024</a:t>
             </a:fld>
             <a:endParaRPr lang="en-US"/>
           </a:p>
@@ -2315,7 +2448,7 @@
           <a:p>
             <a:fld id="{846CE7D5-CF57-46EF-B807-FDD0502418D4}" type="datetimeFigureOut">
               <a:rPr lang="en-US" smtClean="0"/>
-              <a:t>4/9/2024</a:t>
+              <a:t>4/10/2024</a:t>
             </a:fld>
             <a:endParaRPr lang="en-US"/>
           </a:p>
@@ -2682,7 +2815,7 @@
           <a:p>
             <a:fld id="{846CE7D5-CF57-46EF-B807-FDD0502418D4}" type="datetimeFigureOut">
               <a:rPr lang="en-US" smtClean="0"/>
-              <a:t>4/9/2024</a:t>
+              <a:t>4/10/2024</a:t>
             </a:fld>
             <a:endParaRPr lang="en-US"/>
           </a:p>
@@ -2800,7 +2933,7 @@
           <a:p>
             <a:fld id="{846CE7D5-CF57-46EF-B807-FDD0502418D4}" type="datetimeFigureOut">
               <a:rPr lang="en-US" smtClean="0"/>
-              <a:t>4/9/2024</a:t>
+              <a:t>4/10/2024</a:t>
             </a:fld>
             <a:endParaRPr lang="en-US"/>
           </a:p>
@@ -2895,7 +3028,7 @@
           <a:p>
             <a:fld id="{846CE7D5-CF57-46EF-B807-FDD0502418D4}" type="datetimeFigureOut">
               <a:rPr lang="en-US" smtClean="0"/>
-              <a:t>4/9/2024</a:t>
+              <a:t>4/10/2024</a:t>
             </a:fld>
             <a:endParaRPr lang="en-US"/>
           </a:p>
@@ -3172,7 +3305,7 @@
           <a:p>
             <a:fld id="{846CE7D5-CF57-46EF-B807-FDD0502418D4}" type="datetimeFigureOut">
               <a:rPr lang="en-US" smtClean="0"/>
-              <a:t>4/9/2024</a:t>
+              <a:t>4/10/2024</a:t>
             </a:fld>
             <a:endParaRPr lang="en-US"/>
           </a:p>
@@ -3429,7 +3562,7 @@
           <a:p>
             <a:fld id="{846CE7D5-CF57-46EF-B807-FDD0502418D4}" type="datetimeFigureOut">
               <a:rPr lang="en-US" smtClean="0"/>
-              <a:t>4/9/2024</a:t>
+              <a:t>4/10/2024</a:t>
             </a:fld>
             <a:endParaRPr lang="en-US"/>
           </a:p>
@@ -3642,7 +3775,7 @@
           <a:p>
             <a:fld id="{846CE7D5-CF57-46EF-B807-FDD0502418D4}" type="datetimeFigureOut">
               <a:rPr lang="en-US" smtClean="0"/>
-              <a:t>4/9/2024</a:t>
+              <a:t>4/10/2024</a:t>
             </a:fld>
             <a:endParaRPr lang="en-US"/>
           </a:p>
@@ -6489,6 +6622,810 @@
     <p:extLst>
       <p:ext uri="{BB962C8B-B14F-4D97-AF65-F5344CB8AC3E}">
         <p14:creationId xmlns:p14="http://schemas.microsoft.com/office/powerpoint/2010/main" val="51309743"/>
+      </p:ext>
+    </p:extLst>
+  </p:cSld>
+  <p:clrMapOvr>
+    <a:masterClrMapping/>
+  </p:clrMapOvr>
+</p:sld>
+</file>
+
+<file path=ppt/slides/slide4.xml><?xml version="1.0" encoding="utf-8"?>
+<p:sld xmlns:a="http://schemas.openxmlformats.org/drawingml/2006/main" xmlns:r="http://schemas.openxmlformats.org/officeDocument/2006/relationships" xmlns:p="http://schemas.openxmlformats.org/presentationml/2006/main">
+  <p:cSld>
+    <p:bg>
+      <p:bgPr>
+        <a:solidFill>
+          <a:schemeClr val="bg1"/>
+        </a:solidFill>
+        <a:effectLst/>
+      </p:bgPr>
+    </p:bg>
+    <p:spTree>
+      <p:nvGrpSpPr>
+        <p:cNvPr id="1" name=""/>
+        <p:cNvGrpSpPr/>
+        <p:nvPr/>
+      </p:nvGrpSpPr>
+      <p:grpSpPr>
+        <a:xfrm>
+          <a:off x="0" y="0"/>
+          <a:ext cx="0" cy="0"/>
+          <a:chOff x="0" y="0"/>
+          <a:chExt cx="0" cy="0"/>
+        </a:xfrm>
+      </p:grpSpPr>
+      <p:sp useBgFill="1">
+        <p:nvSpPr>
+          <p:cNvPr id="57" name="Rectangle 56">
+            <a:extLst>
+              <a:ext uri="{FF2B5EF4-FFF2-40B4-BE49-F238E27FC236}">
+                <a16:creationId xmlns:a16="http://schemas.microsoft.com/office/drawing/2014/main" id="{100EDD19-6802-4EC3-95CE-CFFAB042CFD6}"/>
+              </a:ext>
+              <a:ext uri="{C183D7F6-B498-43B3-948B-1728B52AA6E4}">
+                <adec:decorative xmlns:adec="http://schemas.microsoft.com/office/drawing/2017/decorative" val="1"/>
+              </a:ext>
+            </a:extLst>
+          </p:cNvPr>
+          <p:cNvSpPr>
+            <a:spLocks noGrp="1" noRot="1" noChangeAspect="1" noMove="1" noResize="1" noEditPoints="1" noAdjustHandles="1" noChangeArrowheads="1" noChangeShapeType="1" noTextEdit="1"/>
+          </p:cNvSpPr>
+          <p:nvPr>
+            <p:extLst>
+              <p:ext uri="{386F3935-93C4-4BCD-93E2-E3B085C9AB24}">
+                <p16:designElem xmlns:p16="http://schemas.microsoft.com/office/powerpoint/2015/main" val="1"/>
+              </p:ext>
+            </p:extLst>
+          </p:nvPr>
+        </p:nvSpPr>
+        <p:spPr>
+          <a:xfrm>
+            <a:off x="0" y="0"/>
+            <a:ext cx="12188952" cy="6858000"/>
+          </a:xfrm>
+          <a:prstGeom prst="rect">
+            <a:avLst/>
+          </a:prstGeom>
+          <a:ln>
+            <a:noFill/>
+          </a:ln>
+        </p:spPr>
+        <p:style>
+          <a:lnRef idx="2">
+            <a:schemeClr val="accent1">
+              <a:shade val="50000"/>
+            </a:schemeClr>
+          </a:lnRef>
+          <a:fillRef idx="1">
+            <a:schemeClr val="accent1"/>
+          </a:fillRef>
+          <a:effectRef idx="0">
+            <a:schemeClr val="accent1"/>
+          </a:effectRef>
+          <a:fontRef idx="minor">
+            <a:schemeClr val="lt1"/>
+          </a:fontRef>
+        </p:style>
+        <p:txBody>
+          <a:bodyPr rtlCol="0" anchor="ctr"/>
+          <a:lstStyle/>
+          <a:p>
+            <a:pPr algn="ctr"/>
+            <a:endParaRPr lang="en-US"/>
+          </a:p>
+        </p:txBody>
+      </p:sp>
+      <p:sp>
+        <p:nvSpPr>
+          <p:cNvPr id="2" name="Title 1">
+            <a:extLst>
+              <a:ext uri="{FF2B5EF4-FFF2-40B4-BE49-F238E27FC236}">
+                <a16:creationId xmlns:a16="http://schemas.microsoft.com/office/drawing/2014/main" id="{6CCA1832-BCF2-E263-A95F-8B54B4DB93E5}"/>
+              </a:ext>
+            </a:extLst>
+          </p:cNvPr>
+          <p:cNvSpPr>
+            <a:spLocks noGrp="1"/>
+          </p:cNvSpPr>
+          <p:nvPr>
+            <p:ph type="title"/>
+          </p:nvPr>
+        </p:nvSpPr>
+        <p:spPr>
+          <a:xfrm>
+            <a:off x="838200" y="365125"/>
+            <a:ext cx="10515600" cy="1325563"/>
+          </a:xfrm>
+        </p:spPr>
+        <p:txBody>
+          <a:bodyPr>
+            <a:normAutofit/>
+          </a:bodyPr>
+          <a:lstStyle/>
+          <a:p>
+            <a:r>
+              <a:rPr lang="en-US" sz="5400" dirty="0">
+                <a:latin typeface="Calibri"/>
+                <a:cs typeface="Calibri"/>
+              </a:rPr>
+              <a:t>How to organize Code</a:t>
+            </a:r>
+          </a:p>
+        </p:txBody>
+      </p:sp>
+      <p:sp>
+        <p:nvSpPr>
+          <p:cNvPr id="58" name="sketch line">
+            <a:extLst>
+              <a:ext uri="{FF2B5EF4-FFF2-40B4-BE49-F238E27FC236}">
+                <a16:creationId xmlns:a16="http://schemas.microsoft.com/office/drawing/2014/main" id="{DB17E863-922E-4C26-BD64-E8FD41D28661}"/>
+              </a:ext>
+              <a:ext uri="{C183D7F6-B498-43B3-948B-1728B52AA6E4}">
+                <adec:decorative xmlns:adec="http://schemas.microsoft.com/office/drawing/2017/decorative" val="1"/>
+              </a:ext>
+            </a:extLst>
+          </p:cNvPr>
+          <p:cNvSpPr>
+            <a:spLocks noGrp="1" noRot="1" noChangeAspect="1" noMove="1" noResize="1" noEditPoints="1" noAdjustHandles="1" noChangeArrowheads="1" noChangeShapeType="1" noTextEdit="1"/>
+          </p:cNvSpPr>
+          <p:nvPr>
+            <p:extLst>
+              <p:ext uri="{386F3935-93C4-4BCD-93E2-E3B085C9AB24}">
+                <p16:designElem xmlns:p16="http://schemas.microsoft.com/office/powerpoint/2015/main" val="1"/>
+              </p:ext>
+            </p:extLst>
+          </p:nvPr>
+        </p:nvSpPr>
+        <p:spPr>
+          <a:xfrm>
+            <a:off x="669036" y="1677373"/>
+            <a:ext cx="10853928" cy="18288"/>
+          </a:xfrm>
+          <a:custGeom>
+            <a:avLst/>
+            <a:gdLst>
+              <a:gd name="connsiteX0" fmla="*/ 0 w 10853928"/>
+              <a:gd name="connsiteY0" fmla="*/ 0 h 18288"/>
+              <a:gd name="connsiteX1" fmla="*/ 461292 w 10853928"/>
+              <a:gd name="connsiteY1" fmla="*/ 0 h 18288"/>
+              <a:gd name="connsiteX2" fmla="*/ 1139662 w 10853928"/>
+              <a:gd name="connsiteY2" fmla="*/ 0 h 18288"/>
+              <a:gd name="connsiteX3" fmla="*/ 1926572 w 10853928"/>
+              <a:gd name="connsiteY3" fmla="*/ 0 h 18288"/>
+              <a:gd name="connsiteX4" fmla="*/ 2279325 w 10853928"/>
+              <a:gd name="connsiteY4" fmla="*/ 0 h 18288"/>
+              <a:gd name="connsiteX5" fmla="*/ 2632078 w 10853928"/>
+              <a:gd name="connsiteY5" fmla="*/ 0 h 18288"/>
+              <a:gd name="connsiteX6" fmla="*/ 3527527 w 10853928"/>
+              <a:gd name="connsiteY6" fmla="*/ 0 h 18288"/>
+              <a:gd name="connsiteX7" fmla="*/ 4205897 w 10853928"/>
+              <a:gd name="connsiteY7" fmla="*/ 0 h 18288"/>
+              <a:gd name="connsiteX8" fmla="*/ 4558650 w 10853928"/>
+              <a:gd name="connsiteY8" fmla="*/ 0 h 18288"/>
+              <a:gd name="connsiteX9" fmla="*/ 5237020 w 10853928"/>
+              <a:gd name="connsiteY9" fmla="*/ 0 h 18288"/>
+              <a:gd name="connsiteX10" fmla="*/ 6132469 w 10853928"/>
+              <a:gd name="connsiteY10" fmla="*/ 0 h 18288"/>
+              <a:gd name="connsiteX11" fmla="*/ 6702301 w 10853928"/>
+              <a:gd name="connsiteY11" fmla="*/ 0 h 18288"/>
+              <a:gd name="connsiteX12" fmla="*/ 7272132 w 10853928"/>
+              <a:gd name="connsiteY12" fmla="*/ 0 h 18288"/>
+              <a:gd name="connsiteX13" fmla="*/ 7950502 w 10853928"/>
+              <a:gd name="connsiteY13" fmla="*/ 0 h 18288"/>
+              <a:gd name="connsiteX14" fmla="*/ 8737412 w 10853928"/>
+              <a:gd name="connsiteY14" fmla="*/ 0 h 18288"/>
+              <a:gd name="connsiteX15" fmla="*/ 9524322 w 10853928"/>
+              <a:gd name="connsiteY15" fmla="*/ 0 h 18288"/>
+              <a:gd name="connsiteX16" fmla="*/ 10853928 w 10853928"/>
+              <a:gd name="connsiteY16" fmla="*/ 0 h 18288"/>
+              <a:gd name="connsiteX17" fmla="*/ 10853928 w 10853928"/>
+              <a:gd name="connsiteY17" fmla="*/ 18288 h 18288"/>
+              <a:gd name="connsiteX18" fmla="*/ 10392636 w 10853928"/>
+              <a:gd name="connsiteY18" fmla="*/ 18288 h 18288"/>
+              <a:gd name="connsiteX19" fmla="*/ 9497187 w 10853928"/>
+              <a:gd name="connsiteY19" fmla="*/ 18288 h 18288"/>
+              <a:gd name="connsiteX20" fmla="*/ 8818817 w 10853928"/>
+              <a:gd name="connsiteY20" fmla="*/ 18288 h 18288"/>
+              <a:gd name="connsiteX21" fmla="*/ 8466064 w 10853928"/>
+              <a:gd name="connsiteY21" fmla="*/ 18288 h 18288"/>
+              <a:gd name="connsiteX22" fmla="*/ 7787693 w 10853928"/>
+              <a:gd name="connsiteY22" fmla="*/ 18288 h 18288"/>
+              <a:gd name="connsiteX23" fmla="*/ 7217862 w 10853928"/>
+              <a:gd name="connsiteY23" fmla="*/ 18288 h 18288"/>
+              <a:gd name="connsiteX24" fmla="*/ 6648031 w 10853928"/>
+              <a:gd name="connsiteY24" fmla="*/ 18288 h 18288"/>
+              <a:gd name="connsiteX25" fmla="*/ 6078200 w 10853928"/>
+              <a:gd name="connsiteY25" fmla="*/ 18288 h 18288"/>
+              <a:gd name="connsiteX26" fmla="*/ 5508368 w 10853928"/>
+              <a:gd name="connsiteY26" fmla="*/ 18288 h 18288"/>
+              <a:gd name="connsiteX27" fmla="*/ 4721459 w 10853928"/>
+              <a:gd name="connsiteY27" fmla="*/ 18288 h 18288"/>
+              <a:gd name="connsiteX28" fmla="*/ 4043088 w 10853928"/>
+              <a:gd name="connsiteY28" fmla="*/ 18288 h 18288"/>
+              <a:gd name="connsiteX29" fmla="*/ 3690336 w 10853928"/>
+              <a:gd name="connsiteY29" fmla="*/ 18288 h 18288"/>
+              <a:gd name="connsiteX30" fmla="*/ 3120504 w 10853928"/>
+              <a:gd name="connsiteY30" fmla="*/ 18288 h 18288"/>
+              <a:gd name="connsiteX31" fmla="*/ 2333595 w 10853928"/>
+              <a:gd name="connsiteY31" fmla="*/ 18288 h 18288"/>
+              <a:gd name="connsiteX32" fmla="*/ 1872303 w 10853928"/>
+              <a:gd name="connsiteY32" fmla="*/ 18288 h 18288"/>
+              <a:gd name="connsiteX33" fmla="*/ 976854 w 10853928"/>
+              <a:gd name="connsiteY33" fmla="*/ 18288 h 18288"/>
+              <a:gd name="connsiteX34" fmla="*/ 0 w 10853928"/>
+              <a:gd name="connsiteY34" fmla="*/ 18288 h 18288"/>
+              <a:gd name="connsiteX35" fmla="*/ 0 w 10853928"/>
+              <a:gd name="connsiteY35" fmla="*/ 0 h 18288"/>
+            </a:gdLst>
+            <a:ahLst/>
+            <a:cxnLst>
+              <a:cxn ang="0">
+                <a:pos x="connsiteX0" y="connsiteY0"/>
+              </a:cxn>
+              <a:cxn ang="0">
+                <a:pos x="connsiteX1" y="connsiteY1"/>
+              </a:cxn>
+              <a:cxn ang="0">
+                <a:pos x="connsiteX2" y="connsiteY2"/>
+              </a:cxn>
+              <a:cxn ang="0">
+                <a:pos x="connsiteX3" y="connsiteY3"/>
+              </a:cxn>
+              <a:cxn ang="0">
+                <a:pos x="connsiteX4" y="connsiteY4"/>
+              </a:cxn>
+              <a:cxn ang="0">
+                <a:pos x="connsiteX5" y="connsiteY5"/>
+              </a:cxn>
+              <a:cxn ang="0">
+                <a:pos x="connsiteX6" y="connsiteY6"/>
+              </a:cxn>
+              <a:cxn ang="0">
+                <a:pos x="connsiteX7" y="connsiteY7"/>
+              </a:cxn>
+              <a:cxn ang="0">
+                <a:pos x="connsiteX8" y="connsiteY8"/>
+              </a:cxn>
+              <a:cxn ang="0">
+                <a:pos x="connsiteX9" y="connsiteY9"/>
+              </a:cxn>
+              <a:cxn ang="0">
+                <a:pos x="connsiteX10" y="connsiteY10"/>
+              </a:cxn>
+              <a:cxn ang="0">
+                <a:pos x="connsiteX11" y="connsiteY11"/>
+              </a:cxn>
+              <a:cxn ang="0">
+                <a:pos x="connsiteX12" y="connsiteY12"/>
+              </a:cxn>
+              <a:cxn ang="0">
+                <a:pos x="connsiteX13" y="connsiteY13"/>
+              </a:cxn>
+              <a:cxn ang="0">
+                <a:pos x="connsiteX14" y="connsiteY14"/>
+              </a:cxn>
+              <a:cxn ang="0">
+                <a:pos x="connsiteX15" y="connsiteY15"/>
+              </a:cxn>
+              <a:cxn ang="0">
+                <a:pos x="connsiteX16" y="connsiteY16"/>
+              </a:cxn>
+              <a:cxn ang="0">
+                <a:pos x="connsiteX17" y="connsiteY17"/>
+              </a:cxn>
+              <a:cxn ang="0">
+                <a:pos x="connsiteX18" y="connsiteY18"/>
+              </a:cxn>
+              <a:cxn ang="0">
+                <a:pos x="connsiteX19" y="connsiteY19"/>
+              </a:cxn>
+              <a:cxn ang="0">
+                <a:pos x="connsiteX20" y="connsiteY20"/>
+              </a:cxn>
+              <a:cxn ang="0">
+                <a:pos x="connsiteX21" y="connsiteY21"/>
+              </a:cxn>
+              <a:cxn ang="0">
+                <a:pos x="connsiteX22" y="connsiteY22"/>
+              </a:cxn>
+              <a:cxn ang="0">
+                <a:pos x="connsiteX23" y="connsiteY23"/>
+              </a:cxn>
+              <a:cxn ang="0">
+                <a:pos x="connsiteX24" y="connsiteY24"/>
+              </a:cxn>
+              <a:cxn ang="0">
+                <a:pos x="connsiteX25" y="connsiteY25"/>
+              </a:cxn>
+              <a:cxn ang="0">
+                <a:pos x="connsiteX26" y="connsiteY26"/>
+              </a:cxn>
+              <a:cxn ang="0">
+                <a:pos x="connsiteX27" y="connsiteY27"/>
+              </a:cxn>
+              <a:cxn ang="0">
+                <a:pos x="connsiteX28" y="connsiteY28"/>
+              </a:cxn>
+              <a:cxn ang="0">
+                <a:pos x="connsiteX29" y="connsiteY29"/>
+              </a:cxn>
+              <a:cxn ang="0">
+                <a:pos x="connsiteX30" y="connsiteY30"/>
+              </a:cxn>
+              <a:cxn ang="0">
+                <a:pos x="connsiteX31" y="connsiteY31"/>
+              </a:cxn>
+              <a:cxn ang="0">
+                <a:pos x="connsiteX32" y="connsiteY32"/>
+              </a:cxn>
+              <a:cxn ang="0">
+                <a:pos x="connsiteX33" y="connsiteY33"/>
+              </a:cxn>
+              <a:cxn ang="0">
+                <a:pos x="connsiteX34" y="connsiteY34"/>
+              </a:cxn>
+              <a:cxn ang="0">
+                <a:pos x="connsiteX35" y="connsiteY35"/>
+              </a:cxn>
+            </a:cxnLst>
+            <a:rect l="l" t="t" r="r" b="b"/>
+            <a:pathLst>
+              <a:path w="10853928" h="18288" fill="none" extrusionOk="0">
+                <a:moveTo>
+                  <a:pt x="0" y="0"/>
+                </a:moveTo>
+                <a:cubicBezTo>
+                  <a:pt x="146993" y="-19076"/>
+                  <a:pt x="347684" y="-4790"/>
+                  <a:pt x="461292" y="0"/>
+                </a:cubicBezTo>
+                <a:cubicBezTo>
+                  <a:pt x="574900" y="4790"/>
+                  <a:pt x="808367" y="19821"/>
+                  <a:pt x="1139662" y="0"/>
+                </a:cubicBezTo>
+                <a:cubicBezTo>
+                  <a:pt x="1470957" y="-19821"/>
+                  <a:pt x="1627405" y="5721"/>
+                  <a:pt x="1926572" y="0"/>
+                </a:cubicBezTo>
+                <a:cubicBezTo>
+                  <a:pt x="2225739" y="-5721"/>
+                  <a:pt x="2137730" y="-3235"/>
+                  <a:pt x="2279325" y="0"/>
+                </a:cubicBezTo>
+                <a:cubicBezTo>
+                  <a:pt x="2420920" y="3235"/>
+                  <a:pt x="2456518" y="9685"/>
+                  <a:pt x="2632078" y="0"/>
+                </a:cubicBezTo>
+                <a:cubicBezTo>
+                  <a:pt x="2807638" y="-9685"/>
+                  <a:pt x="3211516" y="-43007"/>
+                  <a:pt x="3527527" y="0"/>
+                </a:cubicBezTo>
+                <a:cubicBezTo>
+                  <a:pt x="3843538" y="43007"/>
+                  <a:pt x="4058833" y="22042"/>
+                  <a:pt x="4205897" y="0"/>
+                </a:cubicBezTo>
+                <a:cubicBezTo>
+                  <a:pt x="4352961" y="-22042"/>
+                  <a:pt x="4474805" y="-11846"/>
+                  <a:pt x="4558650" y="0"/>
+                </a:cubicBezTo>
+                <a:cubicBezTo>
+                  <a:pt x="4642495" y="11846"/>
+                  <a:pt x="5041928" y="-6069"/>
+                  <a:pt x="5237020" y="0"/>
+                </a:cubicBezTo>
+                <a:cubicBezTo>
+                  <a:pt x="5432112" y="6069"/>
+                  <a:pt x="5943266" y="-17479"/>
+                  <a:pt x="6132469" y="0"/>
+                </a:cubicBezTo>
+                <a:cubicBezTo>
+                  <a:pt x="6321672" y="17479"/>
+                  <a:pt x="6483872" y="26234"/>
+                  <a:pt x="6702301" y="0"/>
+                </a:cubicBezTo>
+                <a:cubicBezTo>
+                  <a:pt x="6920730" y="-26234"/>
+                  <a:pt x="6991194" y="-15156"/>
+                  <a:pt x="7272132" y="0"/>
+                </a:cubicBezTo>
+                <a:cubicBezTo>
+                  <a:pt x="7553070" y="15156"/>
+                  <a:pt x="7684444" y="-32961"/>
+                  <a:pt x="7950502" y="0"/>
+                </a:cubicBezTo>
+                <a:cubicBezTo>
+                  <a:pt x="8216560" y="32961"/>
+                  <a:pt x="8493290" y="-10491"/>
+                  <a:pt x="8737412" y="0"/>
+                </a:cubicBezTo>
+                <a:cubicBezTo>
+                  <a:pt x="8981534" y="10491"/>
+                  <a:pt x="9191586" y="-13899"/>
+                  <a:pt x="9524322" y="0"/>
+                </a:cubicBezTo>
+                <a:cubicBezTo>
+                  <a:pt x="9857058" y="13899"/>
+                  <a:pt x="10297509" y="7485"/>
+                  <a:pt x="10853928" y="0"/>
+                </a:cubicBezTo>
+                <a:cubicBezTo>
+                  <a:pt x="10854574" y="4451"/>
+                  <a:pt x="10854418" y="9226"/>
+                  <a:pt x="10853928" y="18288"/>
+                </a:cubicBezTo>
+                <a:cubicBezTo>
+                  <a:pt x="10691638" y="28522"/>
+                  <a:pt x="10574319" y="29578"/>
+                  <a:pt x="10392636" y="18288"/>
+                </a:cubicBezTo>
+                <a:cubicBezTo>
+                  <a:pt x="10210953" y="6998"/>
+                  <a:pt x="9836277" y="-16742"/>
+                  <a:pt x="9497187" y="18288"/>
+                </a:cubicBezTo>
+                <a:cubicBezTo>
+                  <a:pt x="9158097" y="53318"/>
+                  <a:pt x="9119479" y="30714"/>
+                  <a:pt x="8818817" y="18288"/>
+                </a:cubicBezTo>
+                <a:cubicBezTo>
+                  <a:pt x="8518155" y="5863"/>
+                  <a:pt x="8640037" y="6483"/>
+                  <a:pt x="8466064" y="18288"/>
+                </a:cubicBezTo>
+                <a:cubicBezTo>
+                  <a:pt x="8292091" y="30093"/>
+                  <a:pt x="7997656" y="18914"/>
+                  <a:pt x="7787693" y="18288"/>
+                </a:cubicBezTo>
+                <a:cubicBezTo>
+                  <a:pt x="7577730" y="17662"/>
+                  <a:pt x="7412468" y="21416"/>
+                  <a:pt x="7217862" y="18288"/>
+                </a:cubicBezTo>
+                <a:cubicBezTo>
+                  <a:pt x="7023256" y="15160"/>
+                  <a:pt x="6898018" y="14824"/>
+                  <a:pt x="6648031" y="18288"/>
+                </a:cubicBezTo>
+                <a:cubicBezTo>
+                  <a:pt x="6398044" y="21752"/>
+                  <a:pt x="6254402" y="38625"/>
+                  <a:pt x="6078200" y="18288"/>
+                </a:cubicBezTo>
+                <a:cubicBezTo>
+                  <a:pt x="5901998" y="-2049"/>
+                  <a:pt x="5622886" y="3213"/>
+                  <a:pt x="5508368" y="18288"/>
+                </a:cubicBezTo>
+                <a:cubicBezTo>
+                  <a:pt x="5393850" y="33363"/>
+                  <a:pt x="5036260" y="26830"/>
+                  <a:pt x="4721459" y="18288"/>
+                </a:cubicBezTo>
+                <a:cubicBezTo>
+                  <a:pt x="4406658" y="9746"/>
+                  <a:pt x="4239221" y="41551"/>
+                  <a:pt x="4043088" y="18288"/>
+                </a:cubicBezTo>
+                <a:cubicBezTo>
+                  <a:pt x="3846955" y="-4975"/>
+                  <a:pt x="3818802" y="34658"/>
+                  <a:pt x="3690336" y="18288"/>
+                </a:cubicBezTo>
+                <a:cubicBezTo>
+                  <a:pt x="3561870" y="1918"/>
+                  <a:pt x="3265491" y="42194"/>
+                  <a:pt x="3120504" y="18288"/>
+                </a:cubicBezTo>
+                <a:cubicBezTo>
+                  <a:pt x="2975517" y="-5618"/>
+                  <a:pt x="2720254" y="36673"/>
+                  <a:pt x="2333595" y="18288"/>
+                </a:cubicBezTo>
+                <a:cubicBezTo>
+                  <a:pt x="1946936" y="-97"/>
+                  <a:pt x="2097241" y="5776"/>
+                  <a:pt x="1872303" y="18288"/>
+                </a:cubicBezTo>
+                <a:cubicBezTo>
+                  <a:pt x="1647365" y="30800"/>
+                  <a:pt x="1282708" y="45380"/>
+                  <a:pt x="976854" y="18288"/>
+                </a:cubicBezTo>
+                <a:cubicBezTo>
+                  <a:pt x="671000" y="-8804"/>
+                  <a:pt x="408401" y="-12775"/>
+                  <a:pt x="0" y="18288"/>
+                </a:cubicBezTo>
+                <a:cubicBezTo>
+                  <a:pt x="-213" y="9468"/>
+                  <a:pt x="187" y="4459"/>
+                  <a:pt x="0" y="0"/>
+                </a:cubicBezTo>
+                <a:close/>
+              </a:path>
+              <a:path w="10853928" h="18288" stroke="0" extrusionOk="0">
+                <a:moveTo>
+                  <a:pt x="0" y="0"/>
+                </a:moveTo>
+                <a:cubicBezTo>
+                  <a:pt x="267322" y="15284"/>
+                  <a:pt x="415388" y="-21048"/>
+                  <a:pt x="569831" y="0"/>
+                </a:cubicBezTo>
+                <a:cubicBezTo>
+                  <a:pt x="724274" y="21048"/>
+                  <a:pt x="769333" y="-2353"/>
+                  <a:pt x="922584" y="0"/>
+                </a:cubicBezTo>
+                <a:cubicBezTo>
+                  <a:pt x="1075835" y="2353"/>
+                  <a:pt x="1399490" y="-145"/>
+                  <a:pt x="1818033" y="0"/>
+                </a:cubicBezTo>
+                <a:cubicBezTo>
+                  <a:pt x="2236576" y="145"/>
+                  <a:pt x="2145330" y="5482"/>
+                  <a:pt x="2387864" y="0"/>
+                </a:cubicBezTo>
+                <a:cubicBezTo>
+                  <a:pt x="2630398" y="-5482"/>
+                  <a:pt x="2793207" y="18487"/>
+                  <a:pt x="2957695" y="0"/>
+                </a:cubicBezTo>
+                <a:cubicBezTo>
+                  <a:pt x="3122183" y="-18487"/>
+                  <a:pt x="3579141" y="19003"/>
+                  <a:pt x="3853144" y="0"/>
+                </a:cubicBezTo>
+                <a:cubicBezTo>
+                  <a:pt x="4127147" y="-19003"/>
+                  <a:pt x="4209857" y="12211"/>
+                  <a:pt x="4314436" y="0"/>
+                </a:cubicBezTo>
+                <a:cubicBezTo>
+                  <a:pt x="4419015" y="-12211"/>
+                  <a:pt x="4762459" y="-17220"/>
+                  <a:pt x="5209885" y="0"/>
+                </a:cubicBezTo>
+                <a:cubicBezTo>
+                  <a:pt x="5657311" y="17220"/>
+                  <a:pt x="5692663" y="-3290"/>
+                  <a:pt x="6105335" y="0"/>
+                </a:cubicBezTo>
+                <a:cubicBezTo>
+                  <a:pt x="6518007" y="3290"/>
+                  <a:pt x="6455516" y="-5124"/>
+                  <a:pt x="6783705" y="0"/>
+                </a:cubicBezTo>
+                <a:cubicBezTo>
+                  <a:pt x="7111894" y="5124"/>
+                  <a:pt x="7441941" y="-17829"/>
+                  <a:pt x="7679154" y="0"/>
+                </a:cubicBezTo>
+                <a:cubicBezTo>
+                  <a:pt x="7916367" y="17829"/>
+                  <a:pt x="8102967" y="-24363"/>
+                  <a:pt x="8248985" y="0"/>
+                </a:cubicBezTo>
+                <a:cubicBezTo>
+                  <a:pt x="8395003" y="24363"/>
+                  <a:pt x="8552393" y="25505"/>
+                  <a:pt x="8818817" y="0"/>
+                </a:cubicBezTo>
+                <a:cubicBezTo>
+                  <a:pt x="9085241" y="-25505"/>
+                  <a:pt x="9411308" y="38000"/>
+                  <a:pt x="9605726" y="0"/>
+                </a:cubicBezTo>
+                <a:cubicBezTo>
+                  <a:pt x="9800144" y="-38000"/>
+                  <a:pt x="10006468" y="-25741"/>
+                  <a:pt x="10175558" y="0"/>
+                </a:cubicBezTo>
+                <a:cubicBezTo>
+                  <a:pt x="10344648" y="25741"/>
+                  <a:pt x="10696282" y="695"/>
+                  <a:pt x="10853928" y="0"/>
+                </a:cubicBezTo>
+                <a:cubicBezTo>
+                  <a:pt x="10853521" y="8690"/>
+                  <a:pt x="10853774" y="14141"/>
+                  <a:pt x="10853928" y="18288"/>
+                </a:cubicBezTo>
+                <a:cubicBezTo>
+                  <a:pt x="10608124" y="24255"/>
+                  <a:pt x="10343415" y="22307"/>
+                  <a:pt x="10067018" y="18288"/>
+                </a:cubicBezTo>
+                <a:cubicBezTo>
+                  <a:pt x="9790621" y="14270"/>
+                  <a:pt x="9843266" y="3564"/>
+                  <a:pt x="9714266" y="18288"/>
+                </a:cubicBezTo>
+                <a:cubicBezTo>
+                  <a:pt x="9585266" y="33012"/>
+                  <a:pt x="9379484" y="1875"/>
+                  <a:pt x="9252974" y="18288"/>
+                </a:cubicBezTo>
+                <a:cubicBezTo>
+                  <a:pt x="9126464" y="34701"/>
+                  <a:pt x="8580678" y="-4904"/>
+                  <a:pt x="8357525" y="18288"/>
+                </a:cubicBezTo>
+                <a:cubicBezTo>
+                  <a:pt x="8134372" y="41480"/>
+                  <a:pt x="7903199" y="26458"/>
+                  <a:pt x="7679154" y="18288"/>
+                </a:cubicBezTo>
+                <a:cubicBezTo>
+                  <a:pt x="7455109" y="10118"/>
+                  <a:pt x="7435944" y="27109"/>
+                  <a:pt x="7217862" y="18288"/>
+                </a:cubicBezTo>
+                <a:cubicBezTo>
+                  <a:pt x="6999780" y="9467"/>
+                  <a:pt x="6680409" y="18985"/>
+                  <a:pt x="6539492" y="18288"/>
+                </a:cubicBezTo>
+                <a:cubicBezTo>
+                  <a:pt x="6398575" y="17592"/>
+                  <a:pt x="6312077" y="33018"/>
+                  <a:pt x="6186739" y="18288"/>
+                </a:cubicBezTo>
+                <a:cubicBezTo>
+                  <a:pt x="6061401" y="3558"/>
+                  <a:pt x="5947033" y="12075"/>
+                  <a:pt x="5833986" y="18288"/>
+                </a:cubicBezTo>
+                <a:cubicBezTo>
+                  <a:pt x="5720939" y="24501"/>
+                  <a:pt x="5482226" y="8586"/>
+                  <a:pt x="5155616" y="18288"/>
+                </a:cubicBezTo>
+                <a:cubicBezTo>
+                  <a:pt x="4829006" y="27991"/>
+                  <a:pt x="4841274" y="29316"/>
+                  <a:pt x="4694324" y="18288"/>
+                </a:cubicBezTo>
+                <a:cubicBezTo>
+                  <a:pt x="4547374" y="7260"/>
+                  <a:pt x="4077675" y="7013"/>
+                  <a:pt x="3907414" y="18288"/>
+                </a:cubicBezTo>
+                <a:cubicBezTo>
+                  <a:pt x="3737153" y="29564"/>
+                  <a:pt x="3538393" y="21630"/>
+                  <a:pt x="3446122" y="18288"/>
+                </a:cubicBezTo>
+                <a:cubicBezTo>
+                  <a:pt x="3353851" y="14946"/>
+                  <a:pt x="2990320" y="-8091"/>
+                  <a:pt x="2659212" y="18288"/>
+                </a:cubicBezTo>
+                <a:cubicBezTo>
+                  <a:pt x="2328104" y="44667"/>
+                  <a:pt x="2427653" y="9607"/>
+                  <a:pt x="2306460" y="18288"/>
+                </a:cubicBezTo>
+                <a:cubicBezTo>
+                  <a:pt x="2185267" y="26969"/>
+                  <a:pt x="1719763" y="3717"/>
+                  <a:pt x="1519550" y="18288"/>
+                </a:cubicBezTo>
+                <a:cubicBezTo>
+                  <a:pt x="1319337" y="32860"/>
+                  <a:pt x="1167371" y="17040"/>
+                  <a:pt x="1058258" y="18288"/>
+                </a:cubicBezTo>
+                <a:cubicBezTo>
+                  <a:pt x="949145" y="19536"/>
+                  <a:pt x="780234" y="31447"/>
+                  <a:pt x="705505" y="18288"/>
+                </a:cubicBezTo>
+                <a:cubicBezTo>
+                  <a:pt x="630776" y="5129"/>
+                  <a:pt x="215796" y="30056"/>
+                  <a:pt x="0" y="18288"/>
+                </a:cubicBezTo>
+                <a:cubicBezTo>
+                  <a:pt x="-53" y="11301"/>
+                  <a:pt x="-649" y="7756"/>
+                  <a:pt x="0" y="0"/>
+                </a:cubicBezTo>
+                <a:close/>
+              </a:path>
+            </a:pathLst>
+          </a:custGeom>
+          <a:solidFill>
+            <a:schemeClr val="accent2"/>
+          </a:solidFill>
+          <a:ln w="41275" cap="rnd">
+            <a:solidFill>
+              <a:schemeClr val="accent2"/>
+            </a:solidFill>
+            <a:round/>
+            <a:extLst>
+              <a:ext uri="{C807C97D-BFC1-408E-A445-0C87EB9F89A2}">
+                <ask:lineSketchStyleProps xmlns:ask="http://schemas.microsoft.com/office/drawing/2018/sketchyshapes" sd="1219033472">
+                  <a:prstGeom prst="rect">
+                    <a:avLst/>
+                  </a:prstGeom>
+                  <ask:type>
+                    <ask:lineSketchFreehand/>
+                  </ask:type>
+                </ask:lineSketchStyleProps>
+              </a:ext>
+            </a:extLst>
+          </a:ln>
+        </p:spPr>
+        <p:style>
+          <a:lnRef idx="2">
+            <a:schemeClr val="accent1">
+              <a:shade val="50000"/>
+            </a:schemeClr>
+          </a:lnRef>
+          <a:fillRef idx="1">
+            <a:schemeClr val="accent1"/>
+          </a:fillRef>
+          <a:effectRef idx="0">
+            <a:schemeClr val="accent1"/>
+          </a:effectRef>
+          <a:fontRef idx="minor">
+            <a:schemeClr val="lt1"/>
+          </a:fontRef>
+        </p:style>
+        <p:txBody>
+          <a:bodyPr rtlCol="0" anchor="ctr"/>
+          <a:lstStyle/>
+          <a:p>
+            <a:pPr algn="ctr"/>
+            <a:endParaRPr lang="en-US"/>
+          </a:p>
+        </p:txBody>
+      </p:sp>
+      <p:pic>
+        <p:nvPicPr>
+          <p:cNvPr id="7" name="Picture 6" descr="A screenshot of a computer program&#10;&#10;Description automatically generated">
+            <a:extLst>
+              <a:ext uri="{FF2B5EF4-FFF2-40B4-BE49-F238E27FC236}">
+                <a16:creationId xmlns:a16="http://schemas.microsoft.com/office/drawing/2014/main" id="{6B69919E-C8A6-9FC8-FDE7-584CA05DBDF3}"/>
+              </a:ext>
+            </a:extLst>
+          </p:cNvPr>
+          <p:cNvPicPr>
+            <a:picLocks noChangeAspect="1"/>
+          </p:cNvPicPr>
+          <p:nvPr/>
+        </p:nvPicPr>
+        <p:blipFill>
+          <a:blip r:embed="rId3"/>
+          <a:stretch>
+            <a:fillRect/>
+          </a:stretch>
+        </p:blipFill>
+        <p:spPr>
+          <a:xfrm>
+            <a:off x="1857375" y="1846477"/>
+            <a:ext cx="8477250" cy="4714875"/>
+          </a:xfrm>
+          <a:prstGeom prst="rect">
+            <a:avLst/>
+          </a:prstGeom>
+        </p:spPr>
+      </p:pic>
+    </p:spTree>
+    <p:extLst>
+      <p:ext uri="{BB962C8B-B14F-4D97-AF65-F5344CB8AC3E}">
+        <p14:creationId xmlns:p14="http://schemas.microsoft.com/office/powerpoint/2010/main" val="4060297602"/>
       </p:ext>
     </p:extLst>
   </p:cSld>
@@ -7075,15 +8012,6 @@
 </file>
 
 <file path=customXml/item1.xml><?xml version="1.0" encoding="utf-8"?>
-<?mso-contentType ?>
-<FormTemplates xmlns="http://schemas.microsoft.com/sharepoint/v3/contenttype/forms">
-  <Display>DocumentLibraryForm</Display>
-  <Edit>DocumentLibraryForm</Edit>
-  <New>DocumentLibraryForm</New>
-</FormTemplates>
-</file>
-
-<file path=customXml/item2.xml><?xml version="1.0" encoding="utf-8"?>
 <ct:contentTypeSchema xmlns:ct="http://schemas.microsoft.com/office/2006/metadata/contentType" xmlns:ma="http://schemas.microsoft.com/office/2006/metadata/properties/metaAttributes" ct:_="" ma:_="" ma:contentTypeName="Dokument" ma:contentTypeID="0x010100D621BDA4189E154F90ED0E8C0FA3EBD9" ma:contentTypeVersion="17" ma:contentTypeDescription="Ein neues Dokument erstellen." ma:contentTypeScope="" ma:versionID="14af03d3aa5d72bd2ad0cb50dfd7c0dd">
   <xsd:schema xmlns:xsd="http://www.w3.org/2001/XMLSchema" xmlns:xs="http://www.w3.org/2001/XMLSchema" xmlns:p="http://schemas.microsoft.com/office/2006/metadata/properties" xmlns:ns2="22694a18-230a-4e5d-befa-207f3530a4d2" xmlns:ns3="31c289bb-896d-4442-b563-ee005c0273df" targetNamespace="http://schemas.microsoft.com/office/2006/metadata/properties" ma:root="true" ma:fieldsID="b20e732557c1aa7d6e2d5336cd30369d" ns2:_="" ns3:_="">
     <xsd:import namespace="22694a18-230a-4e5d-befa-207f3530a4d2"/>
@@ -7332,6 +8260,15 @@
 </ct:contentTypeSchema>
 </file>
 
+<file path=customXml/item2.xml><?xml version="1.0" encoding="utf-8"?>
+<?mso-contentType ?>
+<FormTemplates xmlns="http://schemas.microsoft.com/sharepoint/v3/contenttype/forms">
+  <Display>DocumentLibraryForm</Display>
+  <Edit>DocumentLibraryForm</Edit>
+  <New>DocumentLibraryForm</New>
+</FormTemplates>
+</file>
+
 <file path=customXml/item3.xml><?xml version="1.0" encoding="utf-8"?>
 <p:properties xmlns:p="http://schemas.microsoft.com/office/2006/metadata/properties" xmlns:xsi="http://www.w3.org/2001/XMLSchema-instance" xmlns:pc="http://schemas.microsoft.com/office/infopath/2007/PartnerControls">
   <documentManagement>
@@ -7344,14 +8281,6 @@
 </file>
 
 <file path=customXml/itemProps1.xml><?xml version="1.0" encoding="utf-8"?>
-<ds:datastoreItem xmlns:ds="http://schemas.openxmlformats.org/officeDocument/2006/customXml" ds:itemID="{34CEB47A-C3CE-432E-B85C-2596D7DA1C93}">
-  <ds:schemaRefs>
-    <ds:schemaRef ds:uri="http://schemas.microsoft.com/sharepoint/v3/contenttype/forms"/>
-  </ds:schemaRefs>
-</ds:datastoreItem>
-</file>
-
-<file path=customXml/itemProps2.xml><?xml version="1.0" encoding="utf-8"?>
 <ds:datastoreItem xmlns:ds="http://schemas.openxmlformats.org/officeDocument/2006/customXml" ds:itemID="{36C03A66-63E3-4DA8-9AF2-EC50F09C5ED1}">
   <ds:schemaRefs>
     <ds:schemaRef ds:uri="http://schemas.microsoft.com/office/2006/metadata/contentType"/>
@@ -7370,6 +8299,14 @@
 </ds:datastoreItem>
 </file>
 
+<file path=customXml/itemProps2.xml><?xml version="1.0" encoding="utf-8"?>
+<ds:datastoreItem xmlns:ds="http://schemas.openxmlformats.org/officeDocument/2006/customXml" ds:itemID="{34CEB47A-C3CE-432E-B85C-2596D7DA1C93}">
+  <ds:schemaRefs>
+    <ds:schemaRef ds:uri="http://schemas.microsoft.com/sharepoint/v3/contenttype/forms"/>
+  </ds:schemaRefs>
+</ds:datastoreItem>
+</file>
+
 <file path=customXml/itemProps3.xml><?xml version="1.0" encoding="utf-8"?>
 <ds:datastoreItem xmlns:ds="http://schemas.openxmlformats.org/officeDocument/2006/customXml" ds:itemID="{0DAF2711-3505-4570-97FA-D9F6458D46E3}">
   <ds:schemaRefs>

</xml_diff>